<commit_message>
Changed code to use the experi_mod data, changed code to have hard coded 12 source values (determined by input deck), finished run_2, added some things to the powerpoint changed name on report
</commit_message>
<xml_diff>
--- a/Report/HPGe_Automation Optimization_MCNP_Model.pptx
+++ b/Report/HPGe_Automation Optimization_MCNP_Model.pptx
@@ -5,10 +5,10 @@
     <p:sldMasterId id="2147483660" r:id="rId1"/>
   </p:sldMasterIdLst>
   <p:notesMasterIdLst>
-    <p:notesMasterId r:id="rId27"/>
+    <p:notesMasterId r:id="rId30"/>
   </p:notesMasterIdLst>
   <p:handoutMasterIdLst>
-    <p:handoutMasterId r:id="rId28"/>
+    <p:handoutMasterId r:id="rId31"/>
   </p:handoutMasterIdLst>
   <p:sldIdLst>
     <p:sldId id="256" r:id="rId2"/>
@@ -29,13 +29,16 @@
     <p:sldId id="366" r:id="rId17"/>
     <p:sldId id="368" r:id="rId18"/>
     <p:sldId id="369" r:id="rId19"/>
-    <p:sldId id="370" r:id="rId20"/>
-    <p:sldId id="372" r:id="rId21"/>
-    <p:sldId id="371" r:id="rId22"/>
-    <p:sldId id="373" r:id="rId23"/>
-    <p:sldId id="351" r:id="rId24"/>
-    <p:sldId id="353" r:id="rId25"/>
-    <p:sldId id="349" r:id="rId26"/>
+    <p:sldId id="376" r:id="rId20"/>
+    <p:sldId id="374" r:id="rId21"/>
+    <p:sldId id="375" r:id="rId22"/>
+    <p:sldId id="370" r:id="rId23"/>
+    <p:sldId id="372" r:id="rId24"/>
+    <p:sldId id="371" r:id="rId25"/>
+    <p:sldId id="373" r:id="rId26"/>
+    <p:sldId id="351" r:id="rId27"/>
+    <p:sldId id="353" r:id="rId28"/>
+    <p:sldId id="349" r:id="rId29"/>
   </p:sldIdLst>
   <p:sldSz cx="9144000" cy="6858000" type="screen4x3"/>
   <p:notesSz cx="7010400" cy="9296400"/>
@@ -275,7 +278,7 @@
             <a:pPr>
               <a:defRPr/>
             </a:pPr>
-            <a:endParaRPr lang="en-US"/>
+            <a:endParaRPr lang="en-US" dirty="0"/>
           </a:p>
         </p:txBody>
       </p:sp>
@@ -314,9 +317,9 @@
               <a:pPr>
                 <a:defRPr/>
               </a:pPr>
-              <a:t>12/2/2017</a:t>
+              <a:t>12/3/2017</a:t>
             </a:fld>
-            <a:endParaRPr lang="en-US"/>
+            <a:endParaRPr lang="en-US" dirty="0"/>
           </a:p>
         </p:txBody>
       </p:sp>
@@ -350,7 +353,7 @@
             <a:pPr>
               <a:defRPr/>
             </a:pPr>
-            <a:endParaRPr lang="en-US"/>
+            <a:endParaRPr lang="en-US" dirty="0"/>
           </a:p>
         </p:txBody>
       </p:sp>
@@ -391,7 +394,7 @@
               </a:pPr>
               <a:t>‹#›</a:t>
             </a:fld>
-            <a:endParaRPr lang="en-US"/>
+            <a:endParaRPr lang="en-US" dirty="0"/>
           </a:p>
         </p:txBody>
       </p:sp>
@@ -467,7 +470,7 @@
             <a:pPr>
               <a:defRPr/>
             </a:pPr>
-            <a:endParaRPr lang="en-US"/>
+            <a:endParaRPr lang="en-US" dirty="0"/>
           </a:p>
         </p:txBody>
       </p:sp>
@@ -515,7 +518,7 @@
               <a:pPr>
                 <a:defRPr/>
               </a:pPr>
-              <a:t>12/2/2017</a:t>
+              <a:t>12/3/2017</a:t>
             </a:fld>
             <a:endParaRPr lang="en-US" dirty="0"/>
           </a:p>
@@ -655,7 +658,7 @@
             <a:pPr>
               <a:defRPr/>
             </a:pPr>
-            <a:endParaRPr lang="en-US"/>
+            <a:endParaRPr lang="en-US" dirty="0"/>
           </a:p>
         </p:txBody>
       </p:sp>
@@ -1630,6 +1633,47 @@
           <a:bodyPr/>
           <a:lstStyle/>
           <a:p>
+            <a:r>
+              <a:rPr lang="en-US" dirty="0" smtClean="0"/>
+              <a:t>This is the code</a:t>
+            </a:r>
+            <a:r>
+              <a:rPr lang="en-US" baseline="0" dirty="0" smtClean="0"/>
+              <a:t> frequency, just to give some insight on how much was done. It is bloated a little bit since it is probably counting the Data Output files</a:t>
+            </a:r>
+          </a:p>
+          <a:p>
+            <a:endParaRPr lang="en-US" baseline="0" dirty="0" smtClean="0"/>
+          </a:p>
+          <a:p>
+            <a:pPr marL="0" marR="0" lvl="0" indent="0" algn="l" defTabSz="914400" rtl="0" eaLnBrk="0" fontAlgn="base" latinLnBrk="0" hangingPunct="0">
+              <a:lnSpc>
+                <a:spcPct val="100000"/>
+              </a:lnSpc>
+              <a:spcBef>
+                <a:spcPct val="30000"/>
+              </a:spcBef>
+              <a:spcAft>
+                <a:spcPct val="0"/>
+              </a:spcAft>
+              <a:buClrTx/>
+              <a:buSzTx/>
+              <a:buFontTx/>
+              <a:buNone/>
+              <a:tabLst/>
+              <a:defRPr/>
+            </a:pPr>
+            <a:r>
+              <a:rPr lang="en-US" dirty="0" smtClean="0"/>
+              <a:t>Simple sweet</a:t>
+            </a:r>
+            <a:r>
+              <a:rPr lang="en-US" baseline="0" dirty="0" smtClean="0"/>
+              <a:t> and to the point. The created values are from 1] the iteration range and 2] the best value out of the previous parameter results, based on lowest Chi Squared value currently.</a:t>
+            </a:r>
+            <a:endParaRPr lang="en-US" dirty="0" smtClean="0"/>
+          </a:p>
+          <a:p>
             <a:endParaRPr lang="en-US" dirty="0"/>
           </a:p>
         </p:txBody>
@@ -1720,6 +1764,40 @@
           <a:bodyPr/>
           <a:lstStyle/>
           <a:p>
+            <a:r>
+              <a:rPr lang="en-US" dirty="0" smtClean="0"/>
+              <a:t>Include the data from before and after showing</a:t>
+            </a:r>
+            <a:r>
+              <a:rPr lang="en-US" baseline="0" dirty="0" smtClean="0"/>
+              <a:t> how the default values are optimized somewhat. Also include the experimental data.</a:t>
+            </a:r>
+            <a:br>
+              <a:rPr lang="en-US" baseline="0" dirty="0" smtClean="0"/>
+            </a:br>
+            <a:r>
+              <a:rPr lang="en-US" baseline="0" dirty="0" smtClean="0"/>
+              <a:t/>
+            </a:r>
+            <a:br>
+              <a:rPr lang="en-US" baseline="0" dirty="0" smtClean="0"/>
+            </a:br>
+            <a:r>
+              <a:rPr lang="en-US" baseline="0" dirty="0" smtClean="0"/>
+              <a:t>Used relative error since we were trying to get near identical values compared to the given experimental data</a:t>
+            </a:r>
+          </a:p>
+          <a:p>
+            <a:r>
+              <a:rPr lang="en-US" baseline="0" dirty="0" smtClean="0"/>
+              <a:t>Used an average error to simply see if any progress was made without having to look line by line.</a:t>
+            </a:r>
+          </a:p>
+          <a:p>
+            <a:r>
+              <a:rPr lang="en-US" baseline="0" dirty="0" smtClean="0"/>
+              <a:t>Used a Chi Squared value ……….?</a:t>
+            </a:r>
             <a:endParaRPr lang="en-US" dirty="0"/>
           </a:p>
         </p:txBody>
@@ -1747,7 +1825,7 @@
               <a:pPr>
                 <a:defRPr/>
               </a:pPr>
-              <a:t>19</a:t>
+              <a:t>20</a:t>
             </a:fld>
             <a:endParaRPr lang="en-US" dirty="0"/>
           </a:p>
@@ -1756,7 +1834,7 @@
     </p:spTree>
     <p:extLst>
       <p:ext uri="{BB962C8B-B14F-4D97-AF65-F5344CB8AC3E}">
-        <p14:creationId xmlns:p14="http://schemas.microsoft.com/office/powerpoint/2010/main" val="1791849842"/>
+        <p14:creationId xmlns:p14="http://schemas.microsoft.com/office/powerpoint/2010/main" val="3944561536"/>
       </p:ext>
     </p:extLst>
   </p:cSld>
@@ -1810,6 +1888,14 @@
           <a:bodyPr/>
           <a:lstStyle/>
           <a:p>
+            <a:r>
+              <a:rPr lang="en-US" dirty="0" smtClean="0"/>
+              <a:t>Include all</a:t>
+            </a:r>
+            <a:r>
+              <a:rPr lang="en-US" baseline="0" dirty="0" smtClean="0"/>
+              <a:t> the plots explain that these are showing our results in comparison with the given experimental results. Note that the plots were also automated in their creation.</a:t>
+            </a:r>
             <a:endParaRPr lang="en-US" dirty="0"/>
           </a:p>
         </p:txBody>
@@ -1846,7 +1932,7 @@
     </p:spTree>
     <p:extLst>
       <p:ext uri="{BB962C8B-B14F-4D97-AF65-F5344CB8AC3E}">
-        <p14:creationId xmlns:p14="http://schemas.microsoft.com/office/powerpoint/2010/main" val="4141483374"/>
+        <p14:creationId xmlns:p14="http://schemas.microsoft.com/office/powerpoint/2010/main" val="1818278802"/>
       </p:ext>
     </p:extLst>
   </p:cSld>
@@ -2026,7 +2112,7 @@
     </p:spTree>
     <p:extLst>
       <p:ext uri="{BB962C8B-B14F-4D97-AF65-F5344CB8AC3E}">
-        <p14:creationId xmlns:p14="http://schemas.microsoft.com/office/powerpoint/2010/main" val="2319616952"/>
+        <p14:creationId xmlns:p14="http://schemas.microsoft.com/office/powerpoint/2010/main" val="1791849842"/>
       </p:ext>
     </p:extLst>
   </p:cSld>
@@ -2107,7 +2193,7 @@
               <a:pPr>
                 <a:defRPr/>
               </a:pPr>
-              <a:t>23</a:t>
+              <a:t>24</a:t>
             </a:fld>
             <a:endParaRPr lang="en-US" dirty="0"/>
           </a:p>
@@ -2116,7 +2202,7 @@
     </p:spTree>
     <p:extLst>
       <p:ext uri="{BB962C8B-B14F-4D97-AF65-F5344CB8AC3E}">
-        <p14:creationId xmlns:p14="http://schemas.microsoft.com/office/powerpoint/2010/main" val="321018036"/>
+        <p14:creationId xmlns:p14="http://schemas.microsoft.com/office/powerpoint/2010/main" val="4141483374"/>
       </p:ext>
     </p:extLst>
   </p:cSld>
@@ -2197,7 +2283,7 @@
               <a:pPr>
                 <a:defRPr/>
               </a:pPr>
-              <a:t>24</a:t>
+              <a:t>25</a:t>
             </a:fld>
             <a:endParaRPr lang="en-US" dirty="0"/>
           </a:p>
@@ -2206,7 +2292,7 @@
     </p:spTree>
     <p:extLst>
       <p:ext uri="{BB962C8B-B14F-4D97-AF65-F5344CB8AC3E}">
-        <p14:creationId xmlns:p14="http://schemas.microsoft.com/office/powerpoint/2010/main" val="1197035683"/>
+        <p14:creationId xmlns:p14="http://schemas.microsoft.com/office/powerpoint/2010/main" val="2319616952"/>
       </p:ext>
     </p:extLst>
   </p:cSld>
@@ -2287,7 +2373,187 @@
               <a:pPr>
                 <a:defRPr/>
               </a:pPr>
-              <a:t>25</a:t>
+              <a:t>26</a:t>
+            </a:fld>
+            <a:endParaRPr lang="en-US" dirty="0"/>
+          </a:p>
+        </p:txBody>
+      </p:sp>
+    </p:spTree>
+    <p:extLst>
+      <p:ext uri="{BB962C8B-B14F-4D97-AF65-F5344CB8AC3E}">
+        <p14:creationId xmlns:p14="http://schemas.microsoft.com/office/powerpoint/2010/main" val="321018036"/>
+      </p:ext>
+    </p:extLst>
+  </p:cSld>
+  <p:clrMapOvr>
+    <a:masterClrMapping/>
+  </p:clrMapOvr>
+</p:notes>
+</file>
+
+<file path=ppt/notesSlides/notesSlide24.xml><?xml version="1.0" encoding="utf-8"?>
+<p:notes xmlns:a="http://schemas.openxmlformats.org/drawingml/2006/main" xmlns:r="http://schemas.openxmlformats.org/officeDocument/2006/relationships" xmlns:p="http://schemas.openxmlformats.org/presentationml/2006/main">
+  <p:cSld>
+    <p:spTree>
+      <p:nvGrpSpPr>
+        <p:cNvPr id="1" name=""/>
+        <p:cNvGrpSpPr/>
+        <p:nvPr/>
+      </p:nvGrpSpPr>
+      <p:grpSpPr>
+        <a:xfrm>
+          <a:off x="0" y="0"/>
+          <a:ext cx="0" cy="0"/>
+          <a:chOff x="0" y="0"/>
+          <a:chExt cx="0" cy="0"/>
+        </a:xfrm>
+      </p:grpSpPr>
+      <p:sp>
+        <p:nvSpPr>
+          <p:cNvPr id="2" name="Slide Image Placeholder 1"/>
+          <p:cNvSpPr>
+            <a:spLocks noGrp="1" noRot="1" noChangeAspect="1"/>
+          </p:cNvSpPr>
+          <p:nvPr>
+            <p:ph type="sldImg"/>
+          </p:nvPr>
+        </p:nvSpPr>
+        <p:spPr/>
+      </p:sp>
+      <p:sp>
+        <p:nvSpPr>
+          <p:cNvPr id="3" name="Notes Placeholder 2"/>
+          <p:cNvSpPr>
+            <a:spLocks noGrp="1"/>
+          </p:cNvSpPr>
+          <p:nvPr>
+            <p:ph type="body" idx="1"/>
+          </p:nvPr>
+        </p:nvSpPr>
+        <p:spPr/>
+        <p:txBody>
+          <a:bodyPr/>
+          <a:lstStyle/>
+          <a:p>
+            <a:endParaRPr lang="en-US" dirty="0"/>
+          </a:p>
+        </p:txBody>
+      </p:sp>
+      <p:sp>
+        <p:nvSpPr>
+          <p:cNvPr id="4" name="Slide Number Placeholder 3"/>
+          <p:cNvSpPr>
+            <a:spLocks noGrp="1"/>
+          </p:cNvSpPr>
+          <p:nvPr>
+            <p:ph type="sldNum" sz="quarter" idx="10"/>
+          </p:nvPr>
+        </p:nvSpPr>
+        <p:spPr/>
+        <p:txBody>
+          <a:bodyPr/>
+          <a:lstStyle/>
+          <a:p>
+            <a:pPr>
+              <a:defRPr/>
+            </a:pPr>
+            <a:fld id="{1F6B3159-B396-4F1D-8D6C-858A85A1524C}" type="slidenum">
+              <a:rPr lang="en-US" smtClean="0"/>
+              <a:pPr>
+                <a:defRPr/>
+              </a:pPr>
+              <a:t>27</a:t>
+            </a:fld>
+            <a:endParaRPr lang="en-US" dirty="0"/>
+          </a:p>
+        </p:txBody>
+      </p:sp>
+    </p:spTree>
+    <p:extLst>
+      <p:ext uri="{BB962C8B-B14F-4D97-AF65-F5344CB8AC3E}">
+        <p14:creationId xmlns:p14="http://schemas.microsoft.com/office/powerpoint/2010/main" val="1197035683"/>
+      </p:ext>
+    </p:extLst>
+  </p:cSld>
+  <p:clrMapOvr>
+    <a:masterClrMapping/>
+  </p:clrMapOvr>
+</p:notes>
+</file>
+
+<file path=ppt/notesSlides/notesSlide25.xml><?xml version="1.0" encoding="utf-8"?>
+<p:notes xmlns:a="http://schemas.openxmlformats.org/drawingml/2006/main" xmlns:r="http://schemas.openxmlformats.org/officeDocument/2006/relationships" xmlns:p="http://schemas.openxmlformats.org/presentationml/2006/main">
+  <p:cSld>
+    <p:spTree>
+      <p:nvGrpSpPr>
+        <p:cNvPr id="1" name=""/>
+        <p:cNvGrpSpPr/>
+        <p:nvPr/>
+      </p:nvGrpSpPr>
+      <p:grpSpPr>
+        <a:xfrm>
+          <a:off x="0" y="0"/>
+          <a:ext cx="0" cy="0"/>
+          <a:chOff x="0" y="0"/>
+          <a:chExt cx="0" cy="0"/>
+        </a:xfrm>
+      </p:grpSpPr>
+      <p:sp>
+        <p:nvSpPr>
+          <p:cNvPr id="2" name="Slide Image Placeholder 1"/>
+          <p:cNvSpPr>
+            <a:spLocks noGrp="1" noRot="1" noChangeAspect="1"/>
+          </p:cNvSpPr>
+          <p:nvPr>
+            <p:ph type="sldImg"/>
+          </p:nvPr>
+        </p:nvSpPr>
+        <p:spPr/>
+      </p:sp>
+      <p:sp>
+        <p:nvSpPr>
+          <p:cNvPr id="3" name="Notes Placeholder 2"/>
+          <p:cNvSpPr>
+            <a:spLocks noGrp="1"/>
+          </p:cNvSpPr>
+          <p:nvPr>
+            <p:ph type="body" idx="1"/>
+          </p:nvPr>
+        </p:nvSpPr>
+        <p:spPr/>
+        <p:txBody>
+          <a:bodyPr/>
+          <a:lstStyle/>
+          <a:p>
+            <a:endParaRPr lang="en-US" dirty="0"/>
+          </a:p>
+        </p:txBody>
+      </p:sp>
+      <p:sp>
+        <p:nvSpPr>
+          <p:cNvPr id="4" name="Slide Number Placeholder 3"/>
+          <p:cNvSpPr>
+            <a:spLocks noGrp="1"/>
+          </p:cNvSpPr>
+          <p:nvPr>
+            <p:ph type="sldNum" sz="quarter" idx="10"/>
+          </p:nvPr>
+        </p:nvSpPr>
+        <p:spPr/>
+        <p:txBody>
+          <a:bodyPr/>
+          <a:lstStyle/>
+          <a:p>
+            <a:pPr>
+              <a:defRPr/>
+            </a:pPr>
+            <a:fld id="{1F6B3159-B396-4F1D-8D6C-858A85A1524C}" type="slidenum">
+              <a:rPr lang="en-US" smtClean="0"/>
+              <a:pPr>
+                <a:defRPr/>
+              </a:pPr>
+              <a:t>28</a:t>
             </a:fld>
             <a:endParaRPr lang="en-US" dirty="0"/>
           </a:p>
@@ -3226,7 +3492,7 @@
               </a:pPr>
               <a:t>‹#›</a:t>
             </a:fld>
-            <a:endParaRPr lang="en-US"/>
+            <a:endParaRPr lang="en-US" dirty="0"/>
           </a:p>
         </p:txBody>
       </p:sp>
@@ -3312,7 +3578,7 @@
               </a:pPr>
               <a:t>‹#›</a:t>
             </a:fld>
-            <a:endParaRPr lang="en-US"/>
+            <a:endParaRPr lang="en-US" dirty="0"/>
           </a:p>
         </p:txBody>
       </p:sp>
@@ -3960,7 +4226,7 @@
               </a:pPr>
               <a:t>‹#›</a:t>
             </a:fld>
-            <a:endParaRPr lang="en-US"/>
+            <a:endParaRPr lang="en-US" dirty="0"/>
           </a:p>
         </p:txBody>
       </p:sp>
@@ -4655,7 +4921,7 @@
               </a:pPr>
               <a:t>10</a:t>
             </a:fld>
-            <a:endParaRPr lang="en-US"/>
+            <a:endParaRPr lang="en-US" dirty="0"/>
           </a:p>
         </p:txBody>
       </p:sp>
@@ -4856,7 +5122,7 @@
               <a:buNone/>
               <a:tabLst/>
             </a:pPr>
-            <a:endParaRPr kumimoji="0" lang="en-US" sz="1800" b="0" i="0" u="none" strike="noStrike" cap="none" normalizeH="0" baseline="0" smtClean="0">
+            <a:endParaRPr kumimoji="0" lang="en-US" sz="1800" b="0" i="0" u="none" strike="noStrike" cap="none" normalizeH="0" baseline="0" dirty="0" smtClean="0">
               <a:ln>
                 <a:noFill/>
               </a:ln>
@@ -4921,7 +5187,7 @@
               <a:buNone/>
               <a:tabLst/>
             </a:pPr>
-            <a:endParaRPr kumimoji="0" lang="en-US" sz="1800" b="0" i="0" u="none" strike="noStrike" cap="none" normalizeH="0" baseline="0" smtClean="0">
+            <a:endParaRPr kumimoji="0" lang="en-US" sz="1800" b="0" i="0" u="none" strike="noStrike" cap="none" normalizeH="0" baseline="0" dirty="0" smtClean="0">
               <a:ln>
                 <a:noFill/>
               </a:ln>
@@ -4986,7 +5252,7 @@
               <a:buNone/>
               <a:tabLst/>
             </a:pPr>
-            <a:endParaRPr kumimoji="0" lang="en-US" sz="1800" b="0" i="0" u="none" strike="noStrike" cap="none" normalizeH="0" baseline="0" smtClean="0">
+            <a:endParaRPr kumimoji="0" lang="en-US" sz="1800" b="0" i="0" u="none" strike="noStrike" cap="none" normalizeH="0" baseline="0" dirty="0" smtClean="0">
               <a:ln>
                 <a:noFill/>
               </a:ln>
@@ -5051,7 +5317,7 @@
               <a:buNone/>
               <a:tabLst/>
             </a:pPr>
-            <a:endParaRPr kumimoji="0" lang="en-US" sz="1800" b="0" i="0" u="none" strike="noStrike" cap="none" normalizeH="0" baseline="0" smtClean="0">
+            <a:endParaRPr kumimoji="0" lang="en-US" sz="1800" b="0" i="0" u="none" strike="noStrike" cap="none" normalizeH="0" baseline="0" dirty="0" smtClean="0">
               <a:ln>
                 <a:noFill/>
               </a:ln>
@@ -5116,7 +5382,7 @@
               <a:buNone/>
               <a:tabLst/>
             </a:pPr>
-            <a:endParaRPr kumimoji="0" lang="en-US" sz="1800" b="0" i="0" u="none" strike="noStrike" cap="none" normalizeH="0" baseline="0" smtClean="0">
+            <a:endParaRPr kumimoji="0" lang="en-US" sz="1800" b="0" i="0" u="none" strike="noStrike" cap="none" normalizeH="0" baseline="0" dirty="0" smtClean="0">
               <a:ln>
                 <a:noFill/>
               </a:ln>
@@ -5270,7 +5536,7 @@
               <a:buNone/>
               <a:tabLst/>
             </a:pPr>
-            <a:endParaRPr kumimoji="0" lang="en-US" sz="1800" b="0" i="0" u="none" strike="noStrike" cap="none" normalizeH="0" baseline="0" smtClean="0">
+            <a:endParaRPr kumimoji="0" lang="en-US" sz="1800" b="0" i="0" u="none" strike="noStrike" cap="none" normalizeH="0" baseline="0" dirty="0" smtClean="0">
               <a:ln>
                 <a:noFill/>
               </a:ln>
@@ -5978,7 +6244,7 @@
               </a:pPr>
               <a:t>11</a:t>
             </a:fld>
-            <a:endParaRPr lang="en-US"/>
+            <a:endParaRPr lang="en-US" dirty="0"/>
           </a:p>
         </p:txBody>
       </p:sp>
@@ -6132,7 +6398,7 @@
               </a:pPr>
               <a:t>12</a:t>
             </a:fld>
-            <a:endParaRPr lang="en-US"/>
+            <a:endParaRPr lang="en-US" dirty="0"/>
           </a:p>
         </p:txBody>
       </p:sp>
@@ -6263,7 +6529,7 @@
               <a:buNone/>
               <a:tabLst/>
             </a:pPr>
-            <a:endParaRPr kumimoji="0" lang="en-US" sz="1800" b="0" i="0" u="none" strike="noStrike" cap="none" normalizeH="0" baseline="0" smtClean="0">
+            <a:endParaRPr kumimoji="0" lang="en-US" sz="1800" b="0" i="0" u="none" strike="noStrike" cap="none" normalizeH="0" baseline="0" dirty="0" smtClean="0">
               <a:ln>
                 <a:noFill/>
               </a:ln>
@@ -6526,7 +6792,7 @@
               </a:pPr>
               <a:t>13</a:t>
             </a:fld>
-            <a:endParaRPr lang="en-US"/>
+            <a:endParaRPr lang="en-US" dirty="0"/>
           </a:p>
         </p:txBody>
       </p:sp>
@@ -6677,7 +6943,7 @@
             <p:ph idx="1"/>
             <p:extLst>
               <p:ext uri="{D42A27DB-BD31-4B8C-83A1-F6EECF244321}">
-                <p14:modId xmlns:p14="http://schemas.microsoft.com/office/powerpoint/2010/main" val="3075286139"/>
+                <p14:modId xmlns:p14="http://schemas.microsoft.com/office/powerpoint/2010/main" val="1979347270"/>
               </p:ext>
             </p:extLst>
           </p:nvPr>
@@ -6788,7 +7054,7 @@
                         </a:spcAft>
                       </a:pPr>
                       <a:r>
-                        <a:rPr lang="en-US" sz="1600" b="1">
+                        <a:rPr lang="en-US" sz="1600" b="1" dirty="0">
                           <a:effectLst/>
                           <a:latin typeface="Arial" panose="020B0604020202020204" pitchFamily="34" charset="0"/>
                           <a:ea typeface="Calibri" panose="020F0502020204030204" pitchFamily="34" charset="0"/>
@@ -6797,7 +7063,7 @@
                         <a:t>Density [g/cm</a:t>
                       </a:r>
                       <a:r>
-                        <a:rPr lang="en-US" sz="1600" b="1" baseline="30000">
+                        <a:rPr lang="en-US" sz="1600" b="1" baseline="30000" dirty="0">
                           <a:effectLst/>
                           <a:latin typeface="Arial" panose="020B0604020202020204" pitchFamily="34" charset="0"/>
                           <a:ea typeface="Calibri" panose="020F0502020204030204" pitchFamily="34" charset="0"/>
@@ -6806,7 +7072,7 @@
                         <a:t>3</a:t>
                       </a:r>
                       <a:r>
-                        <a:rPr lang="en-US" sz="1600" b="1">
+                        <a:rPr lang="en-US" sz="1600" b="1" dirty="0">
                           <a:effectLst/>
                           <a:latin typeface="Arial" panose="020B0604020202020204" pitchFamily="34" charset="0"/>
                           <a:ea typeface="Calibri" panose="020F0502020204030204" pitchFamily="34" charset="0"/>
@@ -6814,7 +7080,7 @@
                         </a:rPr>
                         <a:t>]</a:t>
                       </a:r>
-                      <a:endParaRPr lang="en-US" sz="1600">
+                      <a:endParaRPr lang="en-US" sz="1600" dirty="0">
                         <a:effectLst/>
                         <a:latin typeface="Calibri" panose="020F0502020204030204" pitchFamily="34" charset="0"/>
                         <a:ea typeface="Calibri" panose="020F0502020204030204" pitchFamily="34" charset="0"/>
@@ -6881,7 +7147,7 @@
                         </a:spcAft>
                       </a:pPr>
                       <a:r>
-                        <a:rPr lang="en-US" sz="1600" b="1">
+                        <a:rPr lang="en-US" sz="1600" b="1" dirty="0">
                           <a:effectLst/>
                           <a:latin typeface="Arial" panose="020B0604020202020204" pitchFamily="34" charset="0"/>
                           <a:ea typeface="Calibri" panose="020F0502020204030204" pitchFamily="34" charset="0"/>
@@ -6889,7 +7155,7 @@
                         </a:rPr>
                         <a:t>Component(s)</a:t>
                       </a:r>
-                      <a:endParaRPr lang="en-US" sz="1600">
+                      <a:endParaRPr lang="en-US" sz="1600" dirty="0">
                         <a:effectLst/>
                         <a:latin typeface="Calibri" panose="020F0502020204030204" pitchFamily="34" charset="0"/>
                         <a:ea typeface="Calibri" panose="020F0502020204030204" pitchFamily="34" charset="0"/>
@@ -7033,7 +7299,7 @@
                         </a:spcAft>
                       </a:pPr>
                       <a:r>
-                        <a:rPr lang="en-US" sz="1600">
+                        <a:rPr lang="en-US" sz="1600" dirty="0">
                           <a:effectLst/>
                           <a:latin typeface="Arial" panose="020B0604020202020204" pitchFamily="34" charset="0"/>
                           <a:ea typeface="Calibri" panose="020F0502020204030204" pitchFamily="34" charset="0"/>
@@ -7041,7 +7307,7 @@
                         </a:rPr>
                         <a:t>1.38</a:t>
                       </a:r>
-                      <a:endParaRPr lang="en-US" sz="1600">
+                      <a:endParaRPr lang="en-US" sz="1600" dirty="0">
                         <a:effectLst/>
                         <a:latin typeface="Calibri" panose="020F0502020204030204" pitchFamily="34" charset="0"/>
                         <a:ea typeface="Calibri" panose="020F0502020204030204" pitchFamily="34" charset="0"/>
@@ -7108,7 +7374,7 @@
                         </a:spcAft>
                       </a:pPr>
                       <a:r>
-                        <a:rPr lang="en-US" sz="1600">
+                        <a:rPr lang="en-US" sz="1600" dirty="0">
                           <a:effectLst/>
                           <a:latin typeface="Arial" panose="020B0604020202020204" pitchFamily="34" charset="0"/>
                           <a:ea typeface="Calibri" panose="020F0502020204030204" pitchFamily="34" charset="0"/>
@@ -7116,7 +7382,7 @@
                         </a:rPr>
                         <a:t>IR Window</a:t>
                       </a:r>
-                      <a:endParaRPr lang="en-US" sz="1600">
+                      <a:endParaRPr lang="en-US" sz="1600" dirty="0">
                         <a:effectLst/>
                         <a:latin typeface="Calibri" panose="020F0502020204030204" pitchFamily="34" charset="0"/>
                         <a:ea typeface="Calibri" panose="020F0502020204030204" pitchFamily="34" charset="0"/>
@@ -7335,7 +7601,7 @@
                         </a:spcAft>
                       </a:pPr>
                       <a:r>
-                        <a:rPr lang="en-US" sz="1600">
+                        <a:rPr lang="en-US" sz="1600" dirty="0">
                           <a:effectLst/>
                           <a:latin typeface="Arial" panose="020B0604020202020204" pitchFamily="34" charset="0"/>
                           <a:ea typeface="Calibri" panose="020F0502020204030204" pitchFamily="34" charset="0"/>
@@ -7343,7 +7609,7 @@
                         </a:rPr>
                         <a:t>Metal Clasps</a:t>
                       </a:r>
-                      <a:endParaRPr lang="en-US" sz="1600">
+                      <a:endParaRPr lang="en-US" sz="1600" dirty="0">
                         <a:effectLst/>
                         <a:latin typeface="Calibri" panose="020F0502020204030204" pitchFamily="34" charset="0"/>
                         <a:ea typeface="Calibri" panose="020F0502020204030204" pitchFamily="34" charset="0"/>
@@ -7412,7 +7678,7 @@
                         </a:spcAft>
                       </a:pPr>
                       <a:r>
-                        <a:rPr lang="en-US" sz="1600">
+                        <a:rPr lang="en-US" sz="1600" dirty="0">
                           <a:effectLst/>
                           <a:latin typeface="Arial" panose="020B0604020202020204" pitchFamily="34" charset="0"/>
                           <a:ea typeface="Calibri" panose="020F0502020204030204" pitchFamily="34" charset="0"/>
@@ -7420,7 +7686,7 @@
                         </a:rPr>
                         <a:t>Aluminum</a:t>
                       </a:r>
-                      <a:endParaRPr lang="en-US" sz="1600">
+                      <a:endParaRPr lang="en-US" sz="1600" dirty="0">
                         <a:effectLst/>
                         <a:latin typeface="Calibri" panose="020F0502020204030204" pitchFamily="34" charset="0"/>
                         <a:ea typeface="Calibri" panose="020F0502020204030204" pitchFamily="34" charset="0"/>
@@ -7562,7 +7828,7 @@
                         </a:spcAft>
                       </a:pPr>
                       <a:r>
-                        <a:rPr lang="en-US" sz="1600">
+                        <a:rPr lang="en-US" sz="1600" dirty="0">
                           <a:effectLst/>
                           <a:latin typeface="Arial" panose="020B0604020202020204" pitchFamily="34" charset="0"/>
                           <a:ea typeface="Calibri" panose="020F0502020204030204" pitchFamily="34" charset="0"/>
@@ -7570,7 +7836,7 @@
                         </a:rPr>
                         <a:t>Detector Housing and Casing</a:t>
                       </a:r>
-                      <a:endParaRPr lang="en-US" sz="1600">
+                      <a:endParaRPr lang="en-US" sz="1600" dirty="0">
                         <a:effectLst/>
                         <a:latin typeface="Calibri" panose="020F0502020204030204" pitchFamily="34" charset="0"/>
                         <a:ea typeface="Calibri" panose="020F0502020204030204" pitchFamily="34" charset="0"/>
@@ -7639,7 +7905,7 @@
                         </a:spcAft>
                       </a:pPr>
                       <a:r>
-                        <a:rPr lang="en-US" sz="1600">
+                        <a:rPr lang="en-US" sz="1600" dirty="0">
                           <a:effectLst/>
                           <a:latin typeface="Arial" panose="020B0604020202020204" pitchFamily="34" charset="0"/>
                           <a:ea typeface="Calibri" panose="020F0502020204030204" pitchFamily="34" charset="0"/>
@@ -7647,7 +7913,7 @@
                         </a:rPr>
                         <a:t>Germanium</a:t>
                       </a:r>
-                      <a:endParaRPr lang="en-US" sz="1600">
+                      <a:endParaRPr lang="en-US" sz="1600" dirty="0">
                         <a:effectLst/>
                         <a:latin typeface="Calibri" panose="020F0502020204030204" pitchFamily="34" charset="0"/>
                         <a:ea typeface="Calibri" panose="020F0502020204030204" pitchFamily="34" charset="0"/>
@@ -7789,7 +8055,7 @@
                         </a:spcAft>
                       </a:pPr>
                       <a:r>
-                        <a:rPr lang="en-US" sz="1600">
+                        <a:rPr lang="en-US" sz="1600" dirty="0">
                           <a:effectLst/>
                           <a:latin typeface="Arial" panose="020B0604020202020204" pitchFamily="34" charset="0"/>
                           <a:ea typeface="Calibri" panose="020F0502020204030204" pitchFamily="34" charset="0"/>
@@ -7797,7 +8063,7 @@
                         </a:rPr>
                         <a:t>Ge Crystal</a:t>
                       </a:r>
-                      <a:endParaRPr lang="en-US" sz="1600">
+                      <a:endParaRPr lang="en-US" sz="1600" dirty="0">
                         <a:effectLst/>
                         <a:latin typeface="Calibri" panose="020F0502020204030204" pitchFamily="34" charset="0"/>
                         <a:ea typeface="Calibri" panose="020F0502020204030204" pitchFamily="34" charset="0"/>
@@ -7866,7 +8132,7 @@
                         </a:spcAft>
                       </a:pPr>
                       <a:r>
-                        <a:rPr lang="en-US" sz="1600">
+                        <a:rPr lang="en-US" sz="1600" dirty="0">
                           <a:effectLst/>
                           <a:latin typeface="Arial" panose="020B0604020202020204" pitchFamily="34" charset="0"/>
                           <a:ea typeface="Calibri" panose="020F0502020204030204" pitchFamily="34" charset="0"/>
@@ -7874,7 +8140,7 @@
                         </a:rPr>
                         <a:t>Lithium</a:t>
                       </a:r>
-                      <a:endParaRPr lang="en-US" sz="1600">
+                      <a:endParaRPr lang="en-US" sz="1600" dirty="0">
                         <a:effectLst/>
                         <a:latin typeface="Calibri" panose="020F0502020204030204" pitchFamily="34" charset="0"/>
                         <a:ea typeface="Calibri" panose="020F0502020204030204" pitchFamily="34" charset="0"/>
@@ -8016,7 +8282,7 @@
                         </a:spcAft>
                       </a:pPr>
                       <a:r>
-                        <a:rPr lang="en-US" sz="1600">
+                        <a:rPr lang="en-US" sz="1600" dirty="0">
                           <a:effectLst/>
                           <a:latin typeface="Arial" panose="020B0604020202020204" pitchFamily="34" charset="0"/>
                           <a:ea typeface="Calibri" panose="020F0502020204030204" pitchFamily="34" charset="0"/>
@@ -8024,7 +8290,7 @@
                         </a:rPr>
                         <a:t>Outer Deadlayer</a:t>
                       </a:r>
-                      <a:endParaRPr lang="en-US" sz="1600">
+                      <a:endParaRPr lang="en-US" sz="1600" dirty="0">
                         <a:effectLst/>
                         <a:latin typeface="Calibri" panose="020F0502020204030204" pitchFamily="34" charset="0"/>
                         <a:ea typeface="Calibri" panose="020F0502020204030204" pitchFamily="34" charset="0"/>
@@ -8093,7 +8359,7 @@
                         </a:spcAft>
                       </a:pPr>
                       <a:r>
-                        <a:rPr lang="en-US" sz="1600">
+                        <a:rPr lang="en-US" sz="1600" dirty="0">
                           <a:effectLst/>
                           <a:latin typeface="Arial" panose="020B0604020202020204" pitchFamily="34" charset="0"/>
                           <a:ea typeface="Calibri" panose="020F0502020204030204" pitchFamily="34" charset="0"/>
@@ -8101,7 +8367,7 @@
                         </a:rPr>
                         <a:t>Boron</a:t>
                       </a:r>
-                      <a:endParaRPr lang="en-US" sz="1600">
+                      <a:endParaRPr lang="en-US" sz="1600" dirty="0">
                         <a:effectLst/>
                         <a:latin typeface="Calibri" panose="020F0502020204030204" pitchFamily="34" charset="0"/>
                         <a:ea typeface="Calibri" panose="020F0502020204030204" pitchFamily="34" charset="0"/>
@@ -8243,7 +8509,7 @@
                         </a:spcAft>
                       </a:pPr>
                       <a:r>
-                        <a:rPr lang="en-US" sz="1600">
+                        <a:rPr lang="en-US" sz="1600" dirty="0">
                           <a:effectLst/>
                           <a:latin typeface="Arial" panose="020B0604020202020204" pitchFamily="34" charset="0"/>
                           <a:ea typeface="Calibri" panose="020F0502020204030204" pitchFamily="34" charset="0"/>
@@ -8251,7 +8517,7 @@
                         </a:rPr>
                         <a:t>Inner Deadlayer</a:t>
                       </a:r>
-                      <a:endParaRPr lang="en-US" sz="1600">
+                      <a:endParaRPr lang="en-US" sz="1600" dirty="0">
                         <a:effectLst/>
                         <a:latin typeface="Calibri" panose="020F0502020204030204" pitchFamily="34" charset="0"/>
                         <a:ea typeface="Calibri" panose="020F0502020204030204" pitchFamily="34" charset="0"/>
@@ -8320,7 +8586,7 @@
                         </a:spcAft>
                       </a:pPr>
                       <a:r>
-                        <a:rPr lang="en-US" sz="1600">
+                        <a:rPr lang="en-US" sz="1600" dirty="0">
                           <a:effectLst/>
                           <a:latin typeface="Arial" panose="020B0604020202020204" pitchFamily="34" charset="0"/>
                           <a:ea typeface="Calibri" panose="020F0502020204030204" pitchFamily="34" charset="0"/>
@@ -8328,7 +8594,7 @@
                         </a:rPr>
                         <a:t>Copper</a:t>
                       </a:r>
-                      <a:endParaRPr lang="en-US" sz="1600">
+                      <a:endParaRPr lang="en-US" sz="1600" dirty="0">
                         <a:effectLst/>
                         <a:latin typeface="Calibri" panose="020F0502020204030204" pitchFamily="34" charset="0"/>
                         <a:ea typeface="Calibri" panose="020F0502020204030204" pitchFamily="34" charset="0"/>
@@ -8547,7 +8813,7 @@
                         </a:spcAft>
                       </a:pPr>
                       <a:r>
-                        <a:rPr lang="en-US" sz="1600">
+                        <a:rPr lang="en-US" sz="1600" dirty="0">
                           <a:effectLst/>
                           <a:latin typeface="Arial" panose="020B0604020202020204" pitchFamily="34" charset="0"/>
                           <a:ea typeface="Calibri" panose="020F0502020204030204" pitchFamily="34" charset="0"/>
@@ -8555,7 +8821,7 @@
                         </a:rPr>
                         <a:t>Tin</a:t>
                       </a:r>
-                      <a:endParaRPr lang="en-US" sz="1600">
+                      <a:endParaRPr lang="en-US" sz="1600" dirty="0">
                         <a:effectLst/>
                         <a:latin typeface="Calibri" panose="020F0502020204030204" pitchFamily="34" charset="0"/>
                         <a:ea typeface="Calibri" panose="020F0502020204030204" pitchFamily="34" charset="0"/>
@@ -8622,7 +8888,7 @@
                         </a:spcAft>
                       </a:pPr>
                       <a:r>
-                        <a:rPr lang="en-US" sz="1600">
+                        <a:rPr lang="en-US" sz="1600" dirty="0">
                           <a:effectLst/>
                           <a:latin typeface="Arial" panose="020B0604020202020204" pitchFamily="34" charset="0"/>
                           <a:ea typeface="Calibri" panose="020F0502020204030204" pitchFamily="34" charset="0"/>
@@ -8630,7 +8896,7 @@
                         </a:rPr>
                         <a:t>7.31</a:t>
                       </a:r>
-                      <a:endParaRPr lang="en-US" sz="1600">
+                      <a:endParaRPr lang="en-US" sz="1600" dirty="0">
                         <a:effectLst/>
                         <a:latin typeface="Calibri" panose="020F0502020204030204" pitchFamily="34" charset="0"/>
                         <a:ea typeface="Calibri" panose="020F0502020204030204" pitchFamily="34" charset="0"/>
@@ -8774,7 +9040,7 @@
                         </a:spcAft>
                       </a:pPr>
                       <a:r>
-                        <a:rPr lang="en-US" sz="1600">
+                        <a:rPr lang="en-US" sz="1600" dirty="0">
                           <a:effectLst/>
                           <a:latin typeface="Arial" panose="020B0604020202020204" pitchFamily="34" charset="0"/>
                           <a:ea typeface="Calibri" panose="020F0502020204030204" pitchFamily="34" charset="0"/>
@@ -8782,7 +9048,7 @@
                         </a:rPr>
                         <a:t>Kapton Film</a:t>
                       </a:r>
-                      <a:endParaRPr lang="en-US" sz="1600">
+                      <a:endParaRPr lang="en-US" sz="1600" dirty="0">
                         <a:effectLst/>
                         <a:latin typeface="Calibri" panose="020F0502020204030204" pitchFamily="34" charset="0"/>
                         <a:ea typeface="Calibri" panose="020F0502020204030204" pitchFamily="34" charset="0"/>
@@ -8849,7 +9115,7 @@
                         </a:spcAft>
                       </a:pPr>
                       <a:r>
-                        <a:rPr lang="en-US" sz="1600">
+                        <a:rPr lang="en-US" sz="1600" dirty="0">
                           <a:effectLst/>
                           <a:latin typeface="Arial" panose="020B0604020202020204" pitchFamily="34" charset="0"/>
                           <a:ea typeface="Calibri" panose="020F0502020204030204" pitchFamily="34" charset="0"/>
@@ -8857,7 +9123,7 @@
                         </a:rPr>
                         <a:t>1.42</a:t>
                       </a:r>
-                      <a:endParaRPr lang="en-US" sz="1600">
+                      <a:endParaRPr lang="en-US" sz="1600" dirty="0">
                         <a:effectLst/>
                         <a:latin typeface="Calibri" panose="020F0502020204030204" pitchFamily="34" charset="0"/>
                         <a:ea typeface="Calibri" panose="020F0502020204030204" pitchFamily="34" charset="0"/>
@@ -9001,7 +9267,7 @@
                         </a:spcAft>
                       </a:pPr>
                       <a:r>
-                        <a:rPr lang="en-US" sz="1600">
+                        <a:rPr lang="en-US" sz="1600" dirty="0">
                           <a:effectLst/>
                           <a:latin typeface="Arial" panose="020B0604020202020204" pitchFamily="34" charset="0"/>
                           <a:ea typeface="Calibri" panose="020F0502020204030204" pitchFamily="34" charset="0"/>
@@ -9009,7 +9275,7 @@
                         </a:rPr>
                         <a:t>Air</a:t>
                       </a:r>
-                      <a:endParaRPr lang="en-US" sz="1600">
+                      <a:endParaRPr lang="en-US" sz="1600" dirty="0">
                         <a:effectLst/>
                         <a:latin typeface="Calibri" panose="020F0502020204030204" pitchFamily="34" charset="0"/>
                         <a:ea typeface="Calibri" panose="020F0502020204030204" pitchFamily="34" charset="0"/>
@@ -9076,7 +9342,7 @@
                         </a:spcAft>
                       </a:pPr>
                       <a:r>
-                        <a:rPr lang="en-US" sz="1600">
+                        <a:rPr lang="en-US" sz="1600" dirty="0">
                           <a:effectLst/>
                           <a:latin typeface="Arial" panose="020B0604020202020204" pitchFamily="34" charset="0"/>
                           <a:ea typeface="Calibri" panose="020F0502020204030204" pitchFamily="34" charset="0"/>
@@ -9084,7 +9350,7 @@
                         </a:rPr>
                         <a:t>0.001224</a:t>
                       </a:r>
-                      <a:endParaRPr lang="en-US" sz="1600">
+                      <a:endParaRPr lang="en-US" sz="1600" dirty="0">
                         <a:effectLst/>
                         <a:latin typeface="Calibri" panose="020F0502020204030204" pitchFamily="34" charset="0"/>
                         <a:ea typeface="Calibri" panose="020F0502020204030204" pitchFamily="34" charset="0"/>
@@ -9228,7 +9494,7 @@
                         </a:spcAft>
                       </a:pPr>
                       <a:r>
-                        <a:rPr lang="en-US" sz="1600">
+                        <a:rPr lang="en-US" sz="1600" dirty="0">
                           <a:effectLst/>
                           <a:latin typeface="Arial" panose="020B0604020202020204" pitchFamily="34" charset="0"/>
                           <a:ea typeface="Calibri" panose="020F0502020204030204" pitchFamily="34" charset="0"/>
@@ -9236,7 +9502,7 @@
                         </a:rPr>
                         <a:t>Lead</a:t>
                       </a:r>
-                      <a:endParaRPr lang="en-US" sz="1600">
+                      <a:endParaRPr lang="en-US" sz="1600" dirty="0">
                         <a:effectLst/>
                         <a:latin typeface="Calibri" panose="020F0502020204030204" pitchFamily="34" charset="0"/>
                         <a:ea typeface="Calibri" panose="020F0502020204030204" pitchFamily="34" charset="0"/>
@@ -9303,7 +9569,7 @@
                         </a:spcAft>
                       </a:pPr>
                       <a:r>
-                        <a:rPr lang="en-US" sz="1600">
+                        <a:rPr lang="en-US" sz="1600" dirty="0">
                           <a:effectLst/>
                           <a:latin typeface="Arial" panose="020B0604020202020204" pitchFamily="34" charset="0"/>
                           <a:ea typeface="Calibri" panose="020F0502020204030204" pitchFamily="34" charset="0"/>
@@ -9311,7 +9577,7 @@
                         </a:rPr>
                         <a:t>11.34</a:t>
                       </a:r>
-                      <a:endParaRPr lang="en-US" sz="1600">
+                      <a:endParaRPr lang="en-US" sz="1600" dirty="0">
                         <a:effectLst/>
                         <a:latin typeface="Calibri" panose="020F0502020204030204" pitchFamily="34" charset="0"/>
                         <a:ea typeface="Calibri" panose="020F0502020204030204" pitchFamily="34" charset="0"/>
@@ -9455,7 +9721,7 @@
                         </a:spcAft>
                       </a:pPr>
                       <a:r>
-                        <a:rPr lang="en-US" sz="1600">
+                        <a:rPr lang="en-US" sz="1600" dirty="0">
                           <a:effectLst/>
                           <a:latin typeface="Arial" panose="020B0604020202020204" pitchFamily="34" charset="0"/>
                           <a:ea typeface="Calibri" panose="020F0502020204030204" pitchFamily="34" charset="0"/>
@@ -9463,7 +9729,7 @@
                         </a:rPr>
                         <a:t>Acrylic Glass</a:t>
                       </a:r>
-                      <a:endParaRPr lang="en-US" sz="1600">
+                      <a:endParaRPr lang="en-US" sz="1600" dirty="0">
                         <a:effectLst/>
                         <a:latin typeface="Calibri" panose="020F0502020204030204" pitchFamily="34" charset="0"/>
                         <a:ea typeface="Calibri" panose="020F0502020204030204" pitchFamily="34" charset="0"/>
@@ -9530,7 +9796,7 @@
                         </a:spcAft>
                       </a:pPr>
                       <a:r>
-                        <a:rPr lang="en-US" sz="1600">
+                        <a:rPr lang="en-US" sz="1600" dirty="0">
                           <a:effectLst/>
                           <a:latin typeface="Arial" panose="020B0604020202020204" pitchFamily="34" charset="0"/>
                           <a:ea typeface="Calibri" panose="020F0502020204030204" pitchFamily="34" charset="0"/>
@@ -9538,7 +9804,7 @@
                         </a:rPr>
                         <a:t>1.19</a:t>
                       </a:r>
-                      <a:endParaRPr lang="en-US" sz="1600">
+                      <a:endParaRPr lang="en-US" sz="1600" dirty="0">
                         <a:effectLst/>
                         <a:latin typeface="Calibri" panose="020F0502020204030204" pitchFamily="34" charset="0"/>
                         <a:ea typeface="Calibri" panose="020F0502020204030204" pitchFamily="34" charset="0"/>
@@ -9682,7 +9948,7 @@
                         </a:spcAft>
                       </a:pPr>
                       <a:r>
-                        <a:rPr lang="en-US" sz="1600">
+                        <a:rPr lang="en-US" sz="1600" dirty="0">
                           <a:effectLst/>
                           <a:latin typeface="Arial" panose="020B0604020202020204" pitchFamily="34" charset="0"/>
                           <a:ea typeface="Calibri" panose="020F0502020204030204" pitchFamily="34" charset="0"/>
@@ -9690,7 +9956,7 @@
                         </a:rPr>
                         <a:t>Vacuum</a:t>
                       </a:r>
-                      <a:endParaRPr lang="en-US" sz="1600">
+                      <a:endParaRPr lang="en-US" sz="1600" dirty="0">
                         <a:effectLst/>
                         <a:latin typeface="Calibri" panose="020F0502020204030204" pitchFamily="34" charset="0"/>
                         <a:ea typeface="Calibri" panose="020F0502020204030204" pitchFamily="34" charset="0"/>
@@ -9757,7 +10023,7 @@
                         </a:spcAft>
                       </a:pPr>
                       <a:r>
-                        <a:rPr lang="en-US" sz="1600">
+                        <a:rPr lang="en-US" sz="1600" dirty="0">
                           <a:effectLst/>
                           <a:latin typeface="Arial" panose="020B0604020202020204" pitchFamily="34" charset="0"/>
                           <a:ea typeface="Calibri" panose="020F0502020204030204" pitchFamily="34" charset="0"/>
@@ -9765,7 +10031,7 @@
                         </a:rPr>
                         <a:t>---</a:t>
                       </a:r>
-                      <a:endParaRPr lang="en-US" sz="1600">
+                      <a:endParaRPr lang="en-US" sz="1600" dirty="0">
                         <a:effectLst/>
                         <a:latin typeface="Calibri" panose="020F0502020204030204" pitchFamily="34" charset="0"/>
                         <a:ea typeface="Calibri" panose="020F0502020204030204" pitchFamily="34" charset="0"/>
@@ -9943,7 +10209,7 @@
               </a:pPr>
               <a:t>14</a:t>
             </a:fld>
-            <a:endParaRPr lang="en-US"/>
+            <a:endParaRPr lang="en-US" dirty="0"/>
           </a:p>
         </p:txBody>
       </p:sp>
@@ -10067,21 +10333,16 @@
               <a:t>No </a:t>
             </a:r>
             <a:r>
-              <a:rPr lang="en-US" dirty="0" err="1" smtClean="0"/>
-              <a:t>photofission</a:t>
+              <a:rPr lang="en-US" dirty="0" smtClean="0"/>
+              <a:t>photo fission</a:t>
             </a:r>
             <a:endParaRPr lang="en-US" dirty="0" smtClean="0"/>
           </a:p>
           <a:p>
             <a:r>
               <a:rPr lang="en-US" dirty="0" smtClean="0"/>
-              <a:t>Doppler </a:t>
+              <a:t>Doppler broadening</a:t>
             </a:r>
-            <a:r>
-              <a:rPr lang="en-US" dirty="0" smtClean="0"/>
-              <a:t>broadening</a:t>
-            </a:r>
-            <a:endParaRPr lang="en-US" dirty="0" smtClean="0"/>
           </a:p>
         </p:txBody>
       </p:sp>
@@ -10133,7 +10394,7 @@
               </a:pPr>
               <a:t>15</a:t>
             </a:fld>
-            <a:endParaRPr lang="en-US"/>
+            <a:endParaRPr lang="en-US" dirty="0"/>
           </a:p>
         </p:txBody>
       </p:sp>
@@ -10541,7 +10802,7 @@
               </a:pPr>
               <a:t>16</a:t>
             </a:fld>
-            <a:endParaRPr lang="en-US"/>
+            <a:endParaRPr lang="en-US" dirty="0"/>
           </a:p>
         </p:txBody>
       </p:sp>
@@ -10923,7 +11184,7 @@
               </a:pPr>
               <a:t>17</a:t>
             </a:fld>
-            <a:endParaRPr lang="en-US"/>
+            <a:endParaRPr lang="en-US" dirty="0"/>
           </a:p>
         </p:txBody>
       </p:sp>
@@ -10936,7 +11197,7 @@
           <p:nvPr>
             <p:extLst>
               <p:ext uri="{D42A27DB-BD31-4B8C-83A1-F6EECF244321}">
-                <p14:modId xmlns:p14="http://schemas.microsoft.com/office/powerpoint/2010/main" val="3275387581"/>
+                <p14:modId xmlns:p14="http://schemas.microsoft.com/office/powerpoint/2010/main" val="2008772397"/>
               </p:ext>
             </p:extLst>
           </p:nvPr>
@@ -11046,7 +11307,7 @@
                         </a:spcAft>
                       </a:pPr>
                       <a:r>
-                        <a:rPr lang="en-US" sz="1800" b="1">
+                        <a:rPr lang="en-US" sz="1800" b="1" dirty="0">
                           <a:effectLst/>
                           <a:latin typeface="Arial" panose="020B0604020202020204" pitchFamily="34" charset="0"/>
                           <a:ea typeface="Calibri" panose="020F0502020204030204" pitchFamily="34" charset="0"/>
@@ -11054,7 +11315,7 @@
                         </a:rPr>
                         <a:t>Initial Value</a:t>
                       </a:r>
-                      <a:endParaRPr lang="en-US" sz="1600">
+                      <a:endParaRPr lang="en-US" sz="1600" dirty="0">
                         <a:effectLst/>
                         <a:latin typeface="Calibri" panose="020F0502020204030204" pitchFamily="34" charset="0"/>
                         <a:ea typeface="Calibri" panose="020F0502020204030204" pitchFamily="34" charset="0"/>
@@ -11198,7 +11459,7 @@
                         </a:spcAft>
                       </a:pPr>
                       <a:r>
-                        <a:rPr lang="en-US" sz="1800">
+                        <a:rPr lang="en-US" sz="1800" dirty="0">
                           <a:effectLst/>
                           <a:latin typeface="Arial" panose="020B0604020202020204" pitchFamily="34" charset="0"/>
                           <a:ea typeface="Calibri" panose="020F0502020204030204" pitchFamily="34" charset="0"/>
@@ -11206,7 +11467,7 @@
                         </a:rPr>
                         <a:t>0.13 cm</a:t>
                       </a:r>
-                      <a:endParaRPr lang="en-US" sz="1600">
+                      <a:endParaRPr lang="en-US" sz="1600" dirty="0">
                         <a:effectLst/>
                         <a:latin typeface="Calibri" panose="020F0502020204030204" pitchFamily="34" charset="0"/>
                         <a:ea typeface="Calibri" panose="020F0502020204030204" pitchFamily="34" charset="0"/>
@@ -11275,7 +11536,7 @@
                         </a:spcAft>
                       </a:pPr>
                       <a:r>
-                        <a:rPr lang="en-US" sz="1800">
+                        <a:rPr lang="en-US" sz="1800" dirty="0">
                           <a:effectLst/>
                           <a:latin typeface="Arial" panose="020B0604020202020204" pitchFamily="34" charset="0"/>
                           <a:ea typeface="Calibri" panose="020F0502020204030204" pitchFamily="34" charset="0"/>
@@ -11283,7 +11544,7 @@
                         </a:rPr>
                         <a:t>Outer Sides Deadlayer</a:t>
                       </a:r>
-                      <a:endParaRPr lang="en-US" sz="1600">
+                      <a:endParaRPr lang="en-US" sz="1600" dirty="0">
                         <a:effectLst/>
                         <a:latin typeface="Calibri" panose="020F0502020204030204" pitchFamily="34" charset="0"/>
                         <a:ea typeface="Calibri" panose="020F0502020204030204" pitchFamily="34" charset="0"/>
@@ -11350,7 +11611,7 @@
                         </a:spcAft>
                       </a:pPr>
                       <a:r>
-                        <a:rPr lang="en-US" sz="1800">
+                        <a:rPr lang="en-US" sz="1800" dirty="0">
                           <a:effectLst/>
                           <a:latin typeface="Arial" panose="020B0604020202020204" pitchFamily="34" charset="0"/>
                           <a:ea typeface="Calibri" panose="020F0502020204030204" pitchFamily="34" charset="0"/>
@@ -11358,7 +11619,7 @@
                         </a:rPr>
                         <a:t>0.13 cm</a:t>
                       </a:r>
-                      <a:endParaRPr lang="en-US" sz="1600">
+                      <a:endParaRPr lang="en-US" sz="1600" dirty="0">
                         <a:effectLst/>
                         <a:latin typeface="Calibri" panose="020F0502020204030204" pitchFamily="34" charset="0"/>
                         <a:ea typeface="Calibri" panose="020F0502020204030204" pitchFamily="34" charset="0"/>
@@ -11502,7 +11763,7 @@
                         </a:spcAft>
                       </a:pPr>
                       <a:r>
-                        <a:rPr lang="en-US" sz="1800">
+                        <a:rPr lang="en-US" sz="1800" dirty="0">
                           <a:effectLst/>
                           <a:latin typeface="Arial" panose="020B0604020202020204" pitchFamily="34" charset="0"/>
                           <a:ea typeface="Calibri" panose="020F0502020204030204" pitchFamily="34" charset="0"/>
@@ -11510,7 +11771,7 @@
                         </a:rPr>
                         <a:t>8.32 cm</a:t>
                       </a:r>
-                      <a:endParaRPr lang="en-US" sz="1600">
+                      <a:endParaRPr lang="en-US" sz="1600" dirty="0">
                         <a:effectLst/>
                         <a:latin typeface="Calibri" panose="020F0502020204030204" pitchFamily="34" charset="0"/>
                         <a:ea typeface="Calibri" panose="020F0502020204030204" pitchFamily="34" charset="0"/>
@@ -11579,7 +11840,7 @@
                         </a:spcAft>
                       </a:pPr>
                       <a:r>
-                        <a:rPr lang="en-US" sz="1800">
+                        <a:rPr lang="en-US" sz="1800" dirty="0">
                           <a:effectLst/>
                           <a:latin typeface="Arial" panose="020B0604020202020204" pitchFamily="34" charset="0"/>
                           <a:ea typeface="Calibri" panose="020F0502020204030204" pitchFamily="34" charset="0"/>
@@ -11587,7 +11848,7 @@
                         </a:rPr>
                         <a:t>Kapton Window</a:t>
                       </a:r>
-                      <a:endParaRPr lang="en-US" sz="1600">
+                      <a:endParaRPr lang="en-US" sz="1600" dirty="0">
                         <a:effectLst/>
                         <a:latin typeface="Calibri" panose="020F0502020204030204" pitchFamily="34" charset="0"/>
                         <a:ea typeface="Calibri" panose="020F0502020204030204" pitchFamily="34" charset="0"/>
@@ -11654,7 +11915,7 @@
                         </a:spcAft>
                       </a:pPr>
                       <a:r>
-                        <a:rPr lang="en-US" sz="1800">
+                        <a:rPr lang="en-US" sz="1800" dirty="0">
                           <a:effectLst/>
                           <a:latin typeface="Arial" panose="020B0604020202020204" pitchFamily="34" charset="0"/>
                           <a:ea typeface="Calibri" panose="020F0502020204030204" pitchFamily="34" charset="0"/>
@@ -11662,7 +11923,7 @@
                         </a:rPr>
                         <a:t>0.01016 cm</a:t>
                       </a:r>
-                      <a:endParaRPr lang="en-US" sz="1600">
+                      <a:endParaRPr lang="en-US" sz="1600" dirty="0">
                         <a:effectLst/>
                         <a:latin typeface="Calibri" panose="020F0502020204030204" pitchFamily="34" charset="0"/>
                         <a:ea typeface="Calibri" panose="020F0502020204030204" pitchFamily="34" charset="0"/>
@@ -11731,7 +11992,7 @@
                         </a:spcAft>
                       </a:pPr>
                       <a:r>
-                        <a:rPr lang="en-US" sz="1800">
+                        <a:rPr lang="en-US" sz="1800" dirty="0">
                           <a:effectLst/>
                           <a:latin typeface="Arial" panose="020B0604020202020204" pitchFamily="34" charset="0"/>
                           <a:ea typeface="Calibri" panose="020F0502020204030204" pitchFamily="34" charset="0"/>
@@ -11739,7 +12000,7 @@
                         </a:rPr>
                         <a:t>Inner Top Coaxial Deadlayer</a:t>
                       </a:r>
-                      <a:endParaRPr lang="en-US" sz="1600">
+                      <a:endParaRPr lang="en-US" sz="1600" dirty="0">
                         <a:effectLst/>
                         <a:latin typeface="Calibri" panose="020F0502020204030204" pitchFamily="34" charset="0"/>
                         <a:ea typeface="Calibri" panose="020F0502020204030204" pitchFamily="34" charset="0"/>
@@ -11806,7 +12067,7 @@
                         </a:spcAft>
                       </a:pPr>
                       <a:r>
-                        <a:rPr lang="en-US" sz="1800">
+                        <a:rPr lang="en-US" sz="1800" dirty="0">
                           <a:effectLst/>
                           <a:latin typeface="Arial" panose="020B0604020202020204" pitchFamily="34" charset="0"/>
                           <a:ea typeface="Calibri" panose="020F0502020204030204" pitchFamily="34" charset="0"/>
@@ -11814,7 +12075,7 @@
                         </a:rPr>
                         <a:t>0.00003 cm</a:t>
                       </a:r>
-                      <a:endParaRPr lang="en-US" sz="1600">
+                      <a:endParaRPr lang="en-US" sz="1600" dirty="0">
                         <a:effectLst/>
                         <a:latin typeface="Calibri" panose="020F0502020204030204" pitchFamily="34" charset="0"/>
                         <a:ea typeface="Calibri" panose="020F0502020204030204" pitchFamily="34" charset="0"/>
@@ -11883,7 +12144,7 @@
                         </a:spcAft>
                       </a:pPr>
                       <a:r>
-                        <a:rPr lang="en-US" sz="1800">
+                        <a:rPr lang="en-US" sz="1800" dirty="0">
                           <a:effectLst/>
                           <a:latin typeface="Arial" panose="020B0604020202020204" pitchFamily="34" charset="0"/>
                           <a:ea typeface="Calibri" panose="020F0502020204030204" pitchFamily="34" charset="0"/>
@@ -11891,7 +12152,7 @@
                         </a:rPr>
                         <a:t>Inner Sides Coaxial Deadlayer</a:t>
                       </a:r>
-                      <a:endParaRPr lang="en-US" sz="1600">
+                      <a:endParaRPr lang="en-US" sz="1600" dirty="0">
                         <a:effectLst/>
                         <a:latin typeface="Calibri" panose="020F0502020204030204" pitchFamily="34" charset="0"/>
                         <a:ea typeface="Calibri" panose="020F0502020204030204" pitchFamily="34" charset="0"/>
@@ -11958,7 +12219,7 @@
                         </a:spcAft>
                       </a:pPr>
                       <a:r>
-                        <a:rPr lang="en-US" sz="1800">
+                        <a:rPr lang="en-US" sz="1800" dirty="0">
                           <a:effectLst/>
                           <a:latin typeface="Arial" panose="020B0604020202020204" pitchFamily="34" charset="0"/>
                           <a:ea typeface="Calibri" panose="020F0502020204030204" pitchFamily="34" charset="0"/>
@@ -11966,7 +12227,7 @@
                         </a:rPr>
                         <a:t>0.00003 cm</a:t>
                       </a:r>
-                      <a:endParaRPr lang="en-US" sz="1600">
+                      <a:endParaRPr lang="en-US" sz="1600" dirty="0">
                         <a:effectLst/>
                         <a:latin typeface="Calibri" panose="020F0502020204030204" pitchFamily="34" charset="0"/>
                         <a:ea typeface="Calibri" panose="020F0502020204030204" pitchFamily="34" charset="0"/>
@@ -12035,7 +12296,7 @@
                         </a:spcAft>
                       </a:pPr>
                       <a:r>
-                        <a:rPr lang="en-US" sz="1800">
+                        <a:rPr lang="en-US" sz="1800" dirty="0">
                           <a:effectLst/>
                           <a:latin typeface="Arial" panose="020B0604020202020204" pitchFamily="34" charset="0"/>
                           <a:ea typeface="Calibri" panose="020F0502020204030204" pitchFamily="34" charset="0"/>
@@ -12043,7 +12304,7 @@
                         </a:rPr>
                         <a:t>Top Al Casing Thickness</a:t>
                       </a:r>
-                      <a:endParaRPr lang="en-US" sz="1600">
+                      <a:endParaRPr lang="en-US" sz="1600" dirty="0">
                         <a:effectLst/>
                         <a:latin typeface="Calibri" panose="020F0502020204030204" pitchFamily="34" charset="0"/>
                         <a:ea typeface="Calibri" panose="020F0502020204030204" pitchFamily="34" charset="0"/>
@@ -12110,7 +12371,7 @@
                         </a:spcAft>
                       </a:pPr>
                       <a:r>
-                        <a:rPr lang="en-US" sz="1800">
+                        <a:rPr lang="en-US" sz="1800" dirty="0">
                           <a:effectLst/>
                           <a:latin typeface="Arial" panose="020B0604020202020204" pitchFamily="34" charset="0"/>
                           <a:ea typeface="Calibri" panose="020F0502020204030204" pitchFamily="34" charset="0"/>
@@ -12118,7 +12379,7 @@
                         </a:rPr>
                         <a:t>0.15 cm</a:t>
                       </a:r>
-                      <a:endParaRPr lang="en-US" sz="1600">
+                      <a:endParaRPr lang="en-US" sz="1600" dirty="0">
                         <a:effectLst/>
                         <a:latin typeface="Calibri" panose="020F0502020204030204" pitchFamily="34" charset="0"/>
                         <a:ea typeface="Calibri" panose="020F0502020204030204" pitchFamily="34" charset="0"/>
@@ -12187,7 +12448,7 @@
                         </a:spcAft>
                       </a:pPr>
                       <a:r>
-                        <a:rPr lang="en-US" sz="1800">
+                        <a:rPr lang="en-US" sz="1800" dirty="0">
                           <a:effectLst/>
                           <a:latin typeface="Arial" panose="020B0604020202020204" pitchFamily="34" charset="0"/>
                           <a:ea typeface="Calibri" panose="020F0502020204030204" pitchFamily="34" charset="0"/>
@@ -12195,7 +12456,7 @@
                         </a:rPr>
                         <a:t>Sides Al Casing Thickness</a:t>
                       </a:r>
-                      <a:endParaRPr lang="en-US" sz="1600">
+                      <a:endParaRPr lang="en-US" sz="1600" dirty="0">
                         <a:effectLst/>
                         <a:latin typeface="Calibri" panose="020F0502020204030204" pitchFamily="34" charset="0"/>
                         <a:ea typeface="Calibri" panose="020F0502020204030204" pitchFamily="34" charset="0"/>
@@ -12262,7 +12523,7 @@
                         </a:spcAft>
                       </a:pPr>
                       <a:r>
-                        <a:rPr lang="en-US" sz="1800">
+                        <a:rPr lang="en-US" sz="1800" dirty="0">
                           <a:effectLst/>
                           <a:latin typeface="Arial" panose="020B0604020202020204" pitchFamily="34" charset="0"/>
                           <a:ea typeface="Calibri" panose="020F0502020204030204" pitchFamily="34" charset="0"/>
@@ -12270,7 +12531,7 @@
                         </a:rPr>
                         <a:t>0.15 cm</a:t>
                       </a:r>
-                      <a:endParaRPr lang="en-US" sz="1600">
+                      <a:endParaRPr lang="en-US" sz="1600" dirty="0">
                         <a:effectLst/>
                         <a:latin typeface="Calibri" panose="020F0502020204030204" pitchFamily="34" charset="0"/>
                         <a:ea typeface="Calibri" panose="020F0502020204030204" pitchFamily="34" charset="0"/>
@@ -12339,7 +12600,7 @@
                         </a:spcAft>
                       </a:pPr>
                       <a:r>
-                        <a:rPr lang="en-US" sz="1800">
+                        <a:rPr lang="en-US" sz="1800" dirty="0">
                           <a:effectLst/>
                           <a:latin typeface="Arial" panose="020B0604020202020204" pitchFamily="34" charset="0"/>
                           <a:ea typeface="Calibri" panose="020F0502020204030204" pitchFamily="34" charset="0"/>
@@ -12347,7 +12608,7 @@
                         </a:rPr>
                         <a:t>Ge Crystal Density</a:t>
                       </a:r>
-                      <a:endParaRPr lang="en-US" sz="1600">
+                      <a:endParaRPr lang="en-US" sz="1600" dirty="0">
                         <a:effectLst/>
                         <a:latin typeface="Calibri" panose="020F0502020204030204" pitchFamily="34" charset="0"/>
                         <a:ea typeface="Calibri" panose="020F0502020204030204" pitchFamily="34" charset="0"/>
@@ -12524,6 +12785,30 @@
           <a:chExt cx="0" cy="0"/>
         </a:xfrm>
       </p:grpSpPr>
+      <p:pic>
+        <p:nvPicPr>
+          <p:cNvPr id="5" name="Picture 4"/>
+          <p:cNvPicPr>
+            <a:picLocks noChangeAspect="1"/>
+          </p:cNvPicPr>
+          <p:nvPr/>
+        </p:nvPicPr>
+        <p:blipFill>
+          <a:blip r:embed="rId3"/>
+          <a:stretch>
+            <a:fillRect/>
+          </a:stretch>
+        </p:blipFill>
+        <p:spPr>
+          <a:xfrm>
+            <a:off x="1219200" y="1099977"/>
+            <a:ext cx="7042251" cy="5224623"/>
+          </a:xfrm>
+          <a:prstGeom prst="rect">
+            <a:avLst/>
+          </a:prstGeom>
+        </p:spPr>
+      </p:pic>
       <p:sp>
         <p:nvSpPr>
           <p:cNvPr id="2" name="Content Placeholder 1"/>
@@ -12546,13 +12831,74 @@
           <a:p>
             <a:r>
               <a:rPr lang="en-US" dirty="0" smtClean="0"/>
-              <a:t>PICTURE</a:t>
+              <a:t>Overview</a:t>
             </a:r>
           </a:p>
           <a:p>
             <a:r>
               <a:rPr lang="en-US" dirty="0" smtClean="0"/>
-              <a:t>Add slides with any title/as many as you want to describe your code and the process</a:t>
+              <a:t>Process</a:t>
+            </a:r>
+            <a:endParaRPr lang="en-US" dirty="0" smtClean="0"/>
+          </a:p>
+          <a:p>
+            <a:pPr marL="855662" lvl="1" indent="-457200">
+              <a:buFont typeface="+mj-lt"/>
+              <a:buAutoNum type="arabicPeriod"/>
+            </a:pPr>
+            <a:r>
+              <a:rPr lang="en-US" dirty="0"/>
+              <a:t>Create Values for the Parameters</a:t>
+            </a:r>
+          </a:p>
+          <a:p>
+            <a:pPr marL="855662" lvl="1" indent="-457200">
+              <a:buFont typeface="+mj-lt"/>
+              <a:buAutoNum type="arabicPeriod"/>
+            </a:pPr>
+            <a:r>
+              <a:rPr lang="en-US" dirty="0"/>
+              <a:t>Alter the MCNP Input Deck</a:t>
+            </a:r>
+          </a:p>
+          <a:p>
+            <a:pPr marL="855662" lvl="1" indent="-457200">
+              <a:buFont typeface="+mj-lt"/>
+              <a:buAutoNum type="arabicPeriod"/>
+            </a:pPr>
+            <a:r>
+              <a:rPr lang="en-US" dirty="0"/>
+              <a:t>Run MCNP </a:t>
+            </a:r>
+          </a:p>
+          <a:p>
+            <a:pPr marL="855662" lvl="1" indent="-457200">
+              <a:buFont typeface="+mj-lt"/>
+              <a:buAutoNum type="arabicPeriod"/>
+            </a:pPr>
+            <a:r>
+              <a:rPr lang="en-US" dirty="0"/>
+              <a:t>Compare the Results</a:t>
+            </a:r>
+          </a:p>
+          <a:p>
+            <a:pPr marL="855662" lvl="1" indent="-457200">
+              <a:buFont typeface="+mj-lt"/>
+              <a:buAutoNum type="arabicPeriod"/>
+            </a:pPr>
+            <a:r>
+              <a:rPr lang="en-US" dirty="0"/>
+              <a:t>Record Clean and Reset</a:t>
+            </a:r>
+          </a:p>
+          <a:p>
+            <a:r>
+              <a:rPr lang="en-US" dirty="0" smtClean="0"/>
+              <a:t>Add </a:t>
+            </a:r>
+            <a:r>
+              <a:rPr lang="en-US" dirty="0" smtClean="0"/>
+              <a:t>slides with any title/as many as you want to describe your code and the process</a:t>
             </a:r>
           </a:p>
           <a:p>
@@ -12561,7 +12907,7 @@
               <a:t>Include our performance metric for comparing experimental vs </a:t>
             </a:r>
             <a:r>
-              <a:rPr lang="en-US" dirty="0" err="1" smtClean="0"/>
+              <a:rPr lang="en-US" dirty="0" smtClean="0"/>
               <a:t>mcnp</a:t>
             </a:r>
             <a:endParaRPr lang="en-US" dirty="0" smtClean="0"/>
@@ -12621,7 +12967,7 @@
               </a:pPr>
               <a:t>18</a:t>
             </a:fld>
-            <a:endParaRPr lang="en-US"/>
+            <a:endParaRPr lang="en-US" dirty="0"/>
           </a:p>
         </p:txBody>
       </p:sp>
@@ -12629,294 +12975,6 @@
     <p:extLst>
       <p:ext uri="{BB962C8B-B14F-4D97-AF65-F5344CB8AC3E}">
         <p14:creationId xmlns:p14="http://schemas.microsoft.com/office/powerpoint/2010/main" val="803912783"/>
-      </p:ext>
-    </p:extLst>
-  </p:cSld>
-  <p:clrMapOvr>
-    <a:masterClrMapping/>
-  </p:clrMapOvr>
-  <p:transition/>
-  <p:timing>
-    <p:tnLst>
-      <p:par>
-        <p:cTn id="1" dur="indefinite" restart="never" nodeType="tmRoot">
-          <p:childTnLst>
-            <p:seq concurrent="1" nextAc="seek">
-              <p:cTn id="2" dur="indefinite" nodeType="mainSeq">
-                <p:childTnLst>
-                  <p:par>
-                    <p:cTn id="3" fill="hold">
-                      <p:stCondLst>
-                        <p:cond delay="indefinite"/>
-                        <p:cond evt="onBegin" delay="0">
-                          <p:tn val="2"/>
-                        </p:cond>
-                      </p:stCondLst>
-                      <p:childTnLst>
-                        <p:par>
-                          <p:cTn id="4" fill="hold">
-                            <p:stCondLst>
-                              <p:cond delay="0"/>
-                            </p:stCondLst>
-                            <p:childTnLst>
-                              <p:par>
-                                <p:cTn id="5" presetID="1" presetClass="entr" presetSubtype="0" fill="hold" nodeType="withEffect">
-                                  <p:stCondLst>
-                                    <p:cond delay="0"/>
-                                  </p:stCondLst>
-                                  <p:childTnLst>
-                                    <p:set>
-                                      <p:cBhvr>
-                                        <p:cTn id="6" dur="1" fill="hold">
-                                          <p:stCondLst>
-                                            <p:cond delay="0"/>
-                                          </p:stCondLst>
-                                        </p:cTn>
-                                        <p:tgtEl>
-                                          <p:spTgt spid="2">
-                                            <p:txEl>
-                                              <p:pRg st="0" end="0"/>
-                                            </p:txEl>
-                                          </p:spTgt>
-                                        </p:tgtEl>
-                                        <p:attrNameLst>
-                                          <p:attrName>style.visibility</p:attrName>
-                                        </p:attrNameLst>
-                                      </p:cBhvr>
-                                      <p:to>
-                                        <p:strVal val="visible"/>
-                                      </p:to>
-                                    </p:set>
-                                  </p:childTnLst>
-                                </p:cTn>
-                              </p:par>
-                              <p:par>
-                                <p:cTn id="7" presetID="1" presetClass="entr" presetSubtype="0" fill="hold" nodeType="withEffect">
-                                  <p:stCondLst>
-                                    <p:cond delay="0"/>
-                                  </p:stCondLst>
-                                  <p:childTnLst>
-                                    <p:set>
-                                      <p:cBhvr>
-                                        <p:cTn id="8" dur="1" fill="hold">
-                                          <p:stCondLst>
-                                            <p:cond delay="0"/>
-                                          </p:stCondLst>
-                                        </p:cTn>
-                                        <p:tgtEl>
-                                          <p:spTgt spid="2">
-                                            <p:txEl>
-                                              <p:pRg st="1" end="1"/>
-                                            </p:txEl>
-                                          </p:spTgt>
-                                        </p:tgtEl>
-                                        <p:attrNameLst>
-                                          <p:attrName>style.visibility</p:attrName>
-                                        </p:attrNameLst>
-                                      </p:cBhvr>
-                                      <p:to>
-                                        <p:strVal val="visible"/>
-                                      </p:to>
-                                    </p:set>
-                                  </p:childTnLst>
-                                </p:cTn>
-                              </p:par>
-                              <p:par>
-                                <p:cTn id="9" presetID="1" presetClass="entr" presetSubtype="0" fill="hold" nodeType="withEffect">
-                                  <p:stCondLst>
-                                    <p:cond delay="0"/>
-                                  </p:stCondLst>
-                                  <p:childTnLst>
-                                    <p:set>
-                                      <p:cBhvr>
-                                        <p:cTn id="10" dur="1" fill="hold">
-                                          <p:stCondLst>
-                                            <p:cond delay="0"/>
-                                          </p:stCondLst>
-                                        </p:cTn>
-                                        <p:tgtEl>
-                                          <p:spTgt spid="2">
-                                            <p:txEl>
-                                              <p:pRg st="2" end="2"/>
-                                            </p:txEl>
-                                          </p:spTgt>
-                                        </p:tgtEl>
-                                        <p:attrNameLst>
-                                          <p:attrName>style.visibility</p:attrName>
-                                        </p:attrNameLst>
-                                      </p:cBhvr>
-                                      <p:to>
-                                        <p:strVal val="visible"/>
-                                      </p:to>
-                                    </p:set>
-                                  </p:childTnLst>
-                                </p:cTn>
-                              </p:par>
-                            </p:childTnLst>
-                          </p:cTn>
-                        </p:par>
-                      </p:childTnLst>
-                    </p:cTn>
-                  </p:par>
-                </p:childTnLst>
-              </p:cTn>
-              <p:prevCondLst>
-                <p:cond evt="onPrev" delay="0">
-                  <p:tgtEl>
-                    <p:sldTgt/>
-                  </p:tgtEl>
-                </p:cond>
-              </p:prevCondLst>
-              <p:nextCondLst>
-                <p:cond evt="onNext" delay="0">
-                  <p:tgtEl>
-                    <p:sldTgt/>
-                  </p:tgtEl>
-                </p:cond>
-              </p:nextCondLst>
-            </p:seq>
-          </p:childTnLst>
-        </p:cTn>
-      </p:par>
-    </p:tnLst>
-  </p:timing>
-</p:sld>
-</file>
-
-<file path=ppt/slides/slide19.xml><?xml version="1.0" encoding="utf-8"?>
-<p:sld xmlns:a="http://schemas.openxmlformats.org/drawingml/2006/main" xmlns:r="http://schemas.openxmlformats.org/officeDocument/2006/relationships" xmlns:p="http://schemas.openxmlformats.org/presentationml/2006/main">
-  <p:cSld>
-    <p:spTree>
-      <p:nvGrpSpPr>
-        <p:cNvPr id="1" name=""/>
-        <p:cNvGrpSpPr/>
-        <p:nvPr/>
-      </p:nvGrpSpPr>
-      <p:grpSpPr>
-        <a:xfrm>
-          <a:off x="0" y="0"/>
-          <a:ext cx="0" cy="0"/>
-          <a:chOff x="0" y="0"/>
-          <a:chExt cx="0" cy="0"/>
-        </a:xfrm>
-      </p:grpSpPr>
-      <p:sp>
-        <p:nvSpPr>
-          <p:cNvPr id="2" name="Content Placeholder 1"/>
-          <p:cNvSpPr>
-            <a:spLocks noGrp="1"/>
-          </p:cNvSpPr>
-          <p:nvPr>
-            <p:ph idx="1"/>
-          </p:nvPr>
-        </p:nvSpPr>
-        <p:spPr>
-          <a:xfrm>
-            <a:off x="304800" y="1295400"/>
-            <a:ext cx="8534400" cy="4876800"/>
-          </a:xfrm>
-        </p:spPr>
-        <p:txBody>
-          <a:bodyPr/>
-          <a:lstStyle/>
-          <a:p>
-            <a:r>
-              <a:rPr lang="en-US" dirty="0" smtClean="0"/>
-              <a:t>Add 5 efficiency plots for experimental verse MCNP</a:t>
-            </a:r>
-          </a:p>
-          <a:p>
-            <a:pPr lvl="1"/>
-            <a:r>
-              <a:rPr lang="en-US" dirty="0" smtClean="0"/>
-              <a:t>Include a table for each too</a:t>
-            </a:r>
-          </a:p>
-          <a:p>
-            <a:r>
-              <a:rPr lang="en-US" dirty="0" smtClean="0"/>
-              <a:t>1 plot for the combined optimal parameters</a:t>
-            </a:r>
-          </a:p>
-          <a:p>
-            <a:r>
-              <a:rPr lang="en-US" dirty="0" smtClean="0"/>
-              <a:t>Advantage results?</a:t>
-            </a:r>
-          </a:p>
-          <a:p>
-            <a:r>
-              <a:rPr lang="en-US" dirty="0" smtClean="0"/>
-              <a:t>Include final value for relative uncertainty</a:t>
-            </a:r>
-            <a:endParaRPr lang="en-US" dirty="0" smtClean="0"/>
-          </a:p>
-        </p:txBody>
-      </p:sp>
-      <p:sp>
-        <p:nvSpPr>
-          <p:cNvPr id="10241" name="Title 1"/>
-          <p:cNvSpPr>
-            <a:spLocks noGrp="1"/>
-          </p:cNvSpPr>
-          <p:nvPr>
-            <p:ph type="title"/>
-          </p:nvPr>
-        </p:nvSpPr>
-        <p:spPr/>
-        <p:txBody>
-          <a:bodyPr/>
-          <a:lstStyle/>
-          <a:p>
-            <a:r>
-              <a:rPr lang="en-US" dirty="0" smtClean="0">
-                <a:solidFill>
-                  <a:srgbClr val="FF0000"/>
-                </a:solidFill>
-              </a:rPr>
-              <a:t>Results</a:t>
-            </a:r>
-            <a:endParaRPr lang="en-US" dirty="0">
-              <a:solidFill>
-                <a:srgbClr val="FF0000"/>
-              </a:solidFill>
-            </a:endParaRPr>
-          </a:p>
-        </p:txBody>
-      </p:sp>
-      <p:sp>
-        <p:nvSpPr>
-          <p:cNvPr id="3" name="Slide Number Placeholder 2"/>
-          <p:cNvSpPr>
-            <a:spLocks noGrp="1"/>
-          </p:cNvSpPr>
-          <p:nvPr>
-            <p:ph type="sldNum" sz="quarter" idx="10"/>
-          </p:nvPr>
-        </p:nvSpPr>
-        <p:spPr/>
-        <p:txBody>
-          <a:bodyPr/>
-          <a:lstStyle/>
-          <a:p>
-            <a:pPr>
-              <a:defRPr/>
-            </a:pPr>
-            <a:fld id="{54D80F8A-463A-4890-BC87-BDB129B2791E}" type="slidenum">
-              <a:rPr lang="en-US" smtClean="0"/>
-              <a:pPr>
-                <a:defRPr/>
-              </a:pPr>
-              <a:t>19</a:t>
-            </a:fld>
-            <a:endParaRPr lang="en-US"/>
-          </a:p>
-        </p:txBody>
-      </p:sp>
-    </p:spTree>
-    <p:extLst>
-      <p:ext uri="{BB962C8B-B14F-4D97-AF65-F5344CB8AC3E}">
-        <p14:creationId xmlns:p14="http://schemas.microsoft.com/office/powerpoint/2010/main" val="2104524501"/>
       </p:ext>
     </p:extLst>
   </p:cSld>
@@ -13102,6 +13160,130 @@
                                   </p:childTnLst>
                                 </p:cTn>
                               </p:par>
+                              <p:par>
+                                <p:cTn id="15" presetID="1" presetClass="entr" presetSubtype="0" fill="hold" nodeType="withEffect">
+                                  <p:stCondLst>
+                                    <p:cond delay="0"/>
+                                  </p:stCondLst>
+                                  <p:childTnLst>
+                                    <p:set>
+                                      <p:cBhvr>
+                                        <p:cTn id="16" dur="1" fill="hold">
+                                          <p:stCondLst>
+                                            <p:cond delay="0"/>
+                                          </p:stCondLst>
+                                        </p:cTn>
+                                        <p:tgtEl>
+                                          <p:spTgt spid="2">
+                                            <p:txEl>
+                                              <p:pRg st="5" end="5"/>
+                                            </p:txEl>
+                                          </p:spTgt>
+                                        </p:tgtEl>
+                                        <p:attrNameLst>
+                                          <p:attrName>style.visibility</p:attrName>
+                                        </p:attrNameLst>
+                                      </p:cBhvr>
+                                      <p:to>
+                                        <p:strVal val="visible"/>
+                                      </p:to>
+                                    </p:set>
+                                  </p:childTnLst>
+                                </p:cTn>
+                              </p:par>
+                              <p:par>
+                                <p:cTn id="17" presetID="1" presetClass="entr" presetSubtype="0" fill="hold" nodeType="withEffect">
+                                  <p:stCondLst>
+                                    <p:cond delay="0"/>
+                                  </p:stCondLst>
+                                  <p:childTnLst>
+                                    <p:set>
+                                      <p:cBhvr>
+                                        <p:cTn id="18" dur="1" fill="hold">
+                                          <p:stCondLst>
+                                            <p:cond delay="0"/>
+                                          </p:stCondLst>
+                                        </p:cTn>
+                                        <p:tgtEl>
+                                          <p:spTgt spid="2">
+                                            <p:txEl>
+                                              <p:pRg st="6" end="6"/>
+                                            </p:txEl>
+                                          </p:spTgt>
+                                        </p:tgtEl>
+                                        <p:attrNameLst>
+                                          <p:attrName>style.visibility</p:attrName>
+                                        </p:attrNameLst>
+                                      </p:cBhvr>
+                                      <p:to>
+                                        <p:strVal val="visible"/>
+                                      </p:to>
+                                    </p:set>
+                                  </p:childTnLst>
+                                </p:cTn>
+                              </p:par>
+                              <p:par>
+                                <p:cTn id="19" presetID="1" presetClass="entr" presetSubtype="0" fill="hold" nodeType="withEffect">
+                                  <p:stCondLst>
+                                    <p:cond delay="0"/>
+                                  </p:stCondLst>
+                                  <p:childTnLst>
+                                    <p:set>
+                                      <p:cBhvr>
+                                        <p:cTn id="20" dur="1" fill="hold">
+                                          <p:stCondLst>
+                                            <p:cond delay="0"/>
+                                          </p:stCondLst>
+                                        </p:cTn>
+                                        <p:tgtEl>
+                                          <p:spTgt spid="2">
+                                            <p:txEl>
+                                              <p:pRg st="7" end="7"/>
+                                            </p:txEl>
+                                          </p:spTgt>
+                                        </p:tgtEl>
+                                        <p:attrNameLst>
+                                          <p:attrName>style.visibility</p:attrName>
+                                        </p:attrNameLst>
+                                      </p:cBhvr>
+                                      <p:to>
+                                        <p:strVal val="visible"/>
+                                      </p:to>
+                                    </p:set>
+                                  </p:childTnLst>
+                                </p:cTn>
+                              </p:par>
+                              <p:par>
+                                <p:cTn id="21" presetID="1" presetClass="entr" presetSubtype="0" fill="hold" nodeType="withEffect">
+                                  <p:stCondLst>
+                                    <p:cond delay="0"/>
+                                  </p:stCondLst>
+                                  <p:childTnLst>
+                                    <p:set>
+                                      <p:cBhvr>
+                                        <p:cTn id="22" dur="1" fill="hold">
+                                          <p:stCondLst>
+                                            <p:cond delay="0"/>
+                                          </p:stCondLst>
+                                        </p:cTn>
+                                        <p:tgtEl>
+                                          <p:spTgt spid="2">
+                                            <p:txEl>
+                                              <p:pRg st="8" end="8"/>
+                                            </p:txEl>
+                                          </p:spTgt>
+                                        </p:tgtEl>
+                                        <p:attrNameLst>
+                                          <p:attrName>style.visibility</p:attrName>
+                                        </p:attrNameLst>
+                                      </p:cBhvr>
+                                      <p:to>
+                                        <p:strVal val="visible"/>
+                                      </p:to>
+                                    </p:set>
+                                  </p:childTnLst>
+                                </p:cTn>
+                              </p:par>
                             </p:childTnLst>
                           </p:cTn>
                         </p:par>
@@ -13130,6 +13312,175 @@
       </p:par>
     </p:tnLst>
   </p:timing>
+</p:sld>
+</file>
+
+<file path=ppt/slides/slide19.xml><?xml version="1.0" encoding="utf-8"?>
+<p:sld xmlns:a="http://schemas.openxmlformats.org/drawingml/2006/main" xmlns:r="http://schemas.openxmlformats.org/officeDocument/2006/relationships" xmlns:p="http://schemas.openxmlformats.org/presentationml/2006/main">
+  <p:cSld>
+    <p:spTree>
+      <p:nvGrpSpPr>
+        <p:cNvPr id="1" name=""/>
+        <p:cNvGrpSpPr/>
+        <p:nvPr/>
+      </p:nvGrpSpPr>
+      <p:grpSpPr>
+        <a:xfrm>
+          <a:off x="0" y="0"/>
+          <a:ext cx="0" cy="0"/>
+          <a:chOff x="0" y="0"/>
+          <a:chExt cx="0" cy="0"/>
+        </a:xfrm>
+      </p:grpSpPr>
+      <p:sp>
+        <p:nvSpPr>
+          <p:cNvPr id="2" name="Title 1"/>
+          <p:cNvSpPr>
+            <a:spLocks noGrp="1"/>
+          </p:cNvSpPr>
+          <p:nvPr>
+            <p:ph type="title"/>
+          </p:nvPr>
+        </p:nvSpPr>
+        <p:spPr/>
+        <p:txBody>
+          <a:bodyPr/>
+          <a:lstStyle/>
+          <a:p>
+            <a:r>
+              <a:rPr lang="en-US" dirty="0" smtClean="0"/>
+              <a:t>What is Created</a:t>
+            </a:r>
+            <a:endParaRPr lang="en-US" dirty="0"/>
+          </a:p>
+        </p:txBody>
+      </p:sp>
+      <p:pic>
+        <p:nvPicPr>
+          <p:cNvPr id="5" name="Content Placeholder 4"/>
+          <p:cNvPicPr>
+            <a:picLocks noGrp="1" noChangeAspect="1"/>
+          </p:cNvPicPr>
+          <p:nvPr>
+            <p:ph idx="1"/>
+          </p:nvPr>
+        </p:nvPicPr>
+        <p:blipFill>
+          <a:blip r:embed="rId2"/>
+          <a:stretch>
+            <a:fillRect/>
+          </a:stretch>
+        </p:blipFill>
+        <p:spPr>
+          <a:xfrm>
+            <a:off x="304800" y="1303337"/>
+            <a:ext cx="2446421" cy="4876800"/>
+          </a:xfrm>
+          <a:prstGeom prst="rect">
+            <a:avLst/>
+          </a:prstGeom>
+        </p:spPr>
+      </p:pic>
+      <p:sp>
+        <p:nvSpPr>
+          <p:cNvPr id="4" name="Slide Number Placeholder 3"/>
+          <p:cNvSpPr>
+            <a:spLocks noGrp="1"/>
+          </p:cNvSpPr>
+          <p:nvPr>
+            <p:ph type="sldNum" sz="quarter" idx="10"/>
+          </p:nvPr>
+        </p:nvSpPr>
+        <p:spPr/>
+        <p:txBody>
+          <a:bodyPr/>
+          <a:lstStyle/>
+          <a:p>
+            <a:pPr>
+              <a:defRPr/>
+            </a:pPr>
+            <a:fld id="{19845459-3F1B-4F43-8FC0-35ADCE8623CC}" type="slidenum">
+              <a:rPr lang="en-US" smtClean="0"/>
+              <a:pPr>
+                <a:defRPr/>
+              </a:pPr>
+              <a:t>19</a:t>
+            </a:fld>
+            <a:endParaRPr lang="en-US" dirty="0"/>
+          </a:p>
+        </p:txBody>
+      </p:sp>
+      <p:sp>
+        <p:nvSpPr>
+          <p:cNvPr id="6" name="TextBox 5"/>
+          <p:cNvSpPr txBox="1"/>
+          <p:nvPr/>
+        </p:nvSpPr>
+        <p:spPr>
+          <a:xfrm>
+            <a:off x="3048000" y="1600200"/>
+            <a:ext cx="5493812" cy="2031325"/>
+          </a:xfrm>
+          <a:prstGeom prst="rect">
+            <a:avLst/>
+          </a:prstGeom>
+          <a:noFill/>
+        </p:spPr>
+        <p:txBody>
+          <a:bodyPr wrap="none" rtlCol="0">
+            <a:spAutoFit/>
+          </a:bodyPr>
+          <a:lstStyle/>
+          <a:p>
+            <a:r>
+              <a:rPr lang="en-US" dirty="0" smtClean="0"/>
+              <a:t>After running MCNP the Output file is striped of its</a:t>
+            </a:r>
+          </a:p>
+          <a:p>
+            <a:r>
+              <a:rPr lang="en-US" dirty="0" smtClean="0"/>
+              <a:t>relevant information.</a:t>
+            </a:r>
+          </a:p>
+          <a:p>
+            <a:endParaRPr lang="en-US" dirty="0"/>
+          </a:p>
+          <a:p>
+            <a:r>
+              <a:rPr lang="en-US" dirty="0" smtClean="0"/>
+              <a:t>Once acquired the Error and the Chi square </a:t>
+            </a:r>
+          </a:p>
+          <a:p>
+            <a:r>
+              <a:rPr lang="en-US" dirty="0" smtClean="0"/>
+              <a:t>Can be determined</a:t>
+            </a:r>
+          </a:p>
+          <a:p>
+            <a:endParaRPr lang="en-US" dirty="0"/>
+          </a:p>
+          <a:p>
+            <a:r>
+              <a:rPr lang="en-US" dirty="0" smtClean="0"/>
+              <a:t>Additionally Plots are able to be created at this point</a:t>
+            </a:r>
+            <a:endParaRPr lang="en-US" dirty="0"/>
+          </a:p>
+        </p:txBody>
+      </p:sp>
+    </p:spTree>
+    <p:extLst>
+      <p:ext uri="{BB962C8B-B14F-4D97-AF65-F5344CB8AC3E}">
+        <p14:creationId xmlns:p14="http://schemas.microsoft.com/office/powerpoint/2010/main" val="3642384374"/>
+      </p:ext>
+    </p:extLst>
+  </p:cSld>
+  <p:clrMapOvr>
+    <a:masterClrMapping/>
+  </p:clrMapOvr>
+  <p:transition/>
 </p:sld>
 </file>
 
@@ -13211,7 +13562,6 @@
               <a:rPr lang="en-US" dirty="0" smtClean="0"/>
               <a:t>Conclusions</a:t>
             </a:r>
-            <a:endParaRPr lang="en-US" dirty="0" smtClean="0"/>
           </a:p>
           <a:p>
             <a:r>
@@ -13269,7 +13619,7 @@
               </a:pPr>
               <a:t>2</a:t>
             </a:fld>
-            <a:endParaRPr lang="en-US"/>
+            <a:endParaRPr lang="en-US" dirty="0"/>
           </a:p>
         </p:txBody>
       </p:sp>
@@ -13649,18 +13999,10 @@
           <a:lstStyle/>
           <a:p>
             <a:r>
-              <a:rPr lang="en-US" dirty="0" smtClean="0">
-                <a:solidFill>
-                  <a:srgbClr val="FF0000"/>
-                </a:solidFill>
-              </a:rPr>
-              <a:t>Conclusion</a:t>
+              <a:rPr lang="en-US" dirty="0" smtClean="0"/>
+              <a:t>Before After</a:t>
             </a:r>
-            <a:endParaRPr lang="en-US" dirty="0">
-              <a:solidFill>
-                <a:srgbClr val="FF0000"/>
-              </a:solidFill>
-            </a:endParaRPr>
+            <a:endParaRPr lang="en-US" dirty="0"/>
           </a:p>
         </p:txBody>
       </p:sp>
@@ -13679,22 +14021,17 @@
           <a:bodyPr/>
           <a:lstStyle/>
           <a:p>
-            <a:r>
-              <a:rPr lang="en-US" dirty="0" smtClean="0"/>
-              <a:t>How close were we?</a:t>
-            </a:r>
-          </a:p>
-          <a:p>
-            <a:r>
-              <a:rPr lang="en-US" dirty="0" smtClean="0"/>
-              <a:t>Does our method work?</a:t>
-            </a:r>
-          </a:p>
-          <a:p>
-            <a:r>
-              <a:rPr lang="en-US" dirty="0" smtClean="0"/>
-              <a:t>Anything?</a:t>
-            </a:r>
+            <a:pPr marL="457200" indent="-457200">
+              <a:buFont typeface="+mj-lt"/>
+              <a:buAutoNum type="arabicPeriod"/>
+            </a:pPr>
+            <a:endParaRPr lang="en-US" dirty="0" smtClean="0"/>
+          </a:p>
+          <a:p>
+            <a:pPr marL="457200" indent="-457200">
+              <a:buFont typeface="+mj-lt"/>
+              <a:buAutoNum type="arabicPeriod"/>
+            </a:pPr>
             <a:endParaRPr lang="en-US" dirty="0"/>
           </a:p>
         </p:txBody>
@@ -13724,14 +14061,71 @@
               </a:pPr>
               <a:t>20</a:t>
             </a:fld>
-            <a:endParaRPr lang="en-US"/>
+            <a:endParaRPr lang="en-US" dirty="0"/>
           </a:p>
         </p:txBody>
       </p:sp>
+      <p:graphicFrame>
+        <p:nvGraphicFramePr>
+          <p:cNvPr id="5" name="Object 4"/>
+          <p:cNvGraphicFramePr>
+            <a:graphicFrameLocks noChangeAspect="1"/>
+          </p:cNvGraphicFramePr>
+          <p:nvPr>
+            <p:extLst>
+              <p:ext uri="{D42A27DB-BD31-4B8C-83A1-F6EECF244321}">
+                <p14:modId xmlns:p14="http://schemas.microsoft.com/office/powerpoint/2010/main" val="477383701"/>
+              </p:ext>
+            </p:extLst>
+          </p:nvPr>
+        </p:nvGraphicFramePr>
+        <p:xfrm>
+          <a:off x="447675" y="1143000"/>
+          <a:ext cx="7734300" cy="5349875"/>
+        </p:xfrm>
+        <a:graphic>
+          <a:graphicData uri="http://schemas.openxmlformats.org/presentationml/2006/ole">
+            <mc:AlternateContent xmlns:mc="http://schemas.openxmlformats.org/markup-compatibility/2006">
+              <mc:Choice xmlns:v="urn:schemas-microsoft-com:vml" Requires="v">
+                <p:oleObj spid="_x0000_s1027" name="Worksheet" r:id="rId4" imgW="7734240" imgH="5915025" progId="Excel.Sheet.8">
+                  <p:embed/>
+                </p:oleObj>
+              </mc:Choice>
+              <mc:Fallback>
+                <p:oleObj name="Worksheet" r:id="rId4" imgW="7734240" imgH="5915025" progId="Excel.Sheet.8">
+                  <p:embed/>
+                  <p:pic>
+                    <p:nvPicPr>
+                      <p:cNvPr id="0" name=""/>
+                      <p:cNvPicPr/>
+                      <p:nvPr/>
+                    </p:nvPicPr>
+                    <p:blipFill>
+                      <a:blip r:embed="rId5"/>
+                      <a:stretch>
+                        <a:fillRect/>
+                      </a:stretch>
+                    </p:blipFill>
+                    <p:spPr>
+                      <a:xfrm>
+                        <a:off x="447675" y="1143000"/>
+                        <a:ext cx="7734300" cy="5349875"/>
+                      </a:xfrm>
+                      <a:prstGeom prst="rect">
+                        <a:avLst/>
+                      </a:prstGeom>
+                    </p:spPr>
+                  </p:pic>
+                </p:oleObj>
+              </mc:Fallback>
+            </mc:AlternateContent>
+          </a:graphicData>
+        </a:graphic>
+      </p:graphicFrame>
     </p:spTree>
     <p:extLst>
       <p:ext uri="{BB962C8B-B14F-4D97-AF65-F5344CB8AC3E}">
-        <p14:creationId xmlns:p14="http://schemas.microsoft.com/office/powerpoint/2010/main" val="3115579710"/>
+        <p14:creationId xmlns:p14="http://schemas.microsoft.com/office/powerpoint/2010/main" val="1850464686"/>
       </p:ext>
     </p:extLst>
   </p:cSld>
@@ -13743,6 +14137,108 @@
 </file>
 
 <file path=ppt/slides/slide21.xml><?xml version="1.0" encoding="utf-8"?>
+<p:sld xmlns:a="http://schemas.openxmlformats.org/drawingml/2006/main" xmlns:r="http://schemas.openxmlformats.org/officeDocument/2006/relationships" xmlns:p="http://schemas.openxmlformats.org/presentationml/2006/main">
+  <p:cSld>
+    <p:spTree>
+      <p:nvGrpSpPr>
+        <p:cNvPr id="1" name=""/>
+        <p:cNvGrpSpPr/>
+        <p:nvPr/>
+      </p:nvGrpSpPr>
+      <p:grpSpPr>
+        <a:xfrm>
+          <a:off x="0" y="0"/>
+          <a:ext cx="0" cy="0"/>
+          <a:chOff x="0" y="0"/>
+          <a:chExt cx="0" cy="0"/>
+        </a:xfrm>
+      </p:grpSpPr>
+      <p:sp>
+        <p:nvSpPr>
+          <p:cNvPr id="2" name="Title 1"/>
+          <p:cNvSpPr>
+            <a:spLocks noGrp="1"/>
+          </p:cNvSpPr>
+          <p:nvPr>
+            <p:ph type="title"/>
+          </p:nvPr>
+        </p:nvSpPr>
+        <p:spPr/>
+        <p:txBody>
+          <a:bodyPr/>
+          <a:lstStyle/>
+          <a:p>
+            <a:r>
+              <a:rPr lang="en-US" dirty="0" smtClean="0"/>
+              <a:t>Plots</a:t>
+            </a:r>
+            <a:endParaRPr lang="en-US" dirty="0"/>
+          </a:p>
+        </p:txBody>
+      </p:sp>
+      <p:sp>
+        <p:nvSpPr>
+          <p:cNvPr id="3" name="Content Placeholder 2"/>
+          <p:cNvSpPr>
+            <a:spLocks noGrp="1"/>
+          </p:cNvSpPr>
+          <p:nvPr>
+            <p:ph idx="1"/>
+          </p:nvPr>
+        </p:nvSpPr>
+        <p:spPr/>
+        <p:txBody>
+          <a:bodyPr/>
+          <a:lstStyle/>
+          <a:p>
+            <a:endParaRPr lang="en-US" dirty="0"/>
+          </a:p>
+        </p:txBody>
+      </p:sp>
+      <p:sp>
+        <p:nvSpPr>
+          <p:cNvPr id="4" name="Slide Number Placeholder 3"/>
+          <p:cNvSpPr>
+            <a:spLocks noGrp="1"/>
+          </p:cNvSpPr>
+          <p:nvPr>
+            <p:ph type="sldNum" sz="quarter" idx="10"/>
+          </p:nvPr>
+        </p:nvSpPr>
+        <p:spPr/>
+        <p:txBody>
+          <a:bodyPr/>
+          <a:lstStyle/>
+          <a:p>
+            <a:pPr>
+              <a:defRPr/>
+            </a:pPr>
+            <a:fld id="{19845459-3F1B-4F43-8FC0-35ADCE8623CC}" type="slidenum">
+              <a:rPr lang="en-US" smtClean="0"/>
+              <a:pPr>
+                <a:defRPr/>
+              </a:pPr>
+              <a:t>21</a:t>
+            </a:fld>
+            <a:endParaRPr lang="en-US" dirty="0"/>
+          </a:p>
+        </p:txBody>
+      </p:sp>
+    </p:spTree>
+    <p:extLst>
+      <p:ext uri="{BB962C8B-B14F-4D97-AF65-F5344CB8AC3E}">
+        <p14:creationId xmlns:p14="http://schemas.microsoft.com/office/powerpoint/2010/main" val="484571894"/>
+      </p:ext>
+    </p:extLst>
+  </p:cSld>
+  <p:clrMapOvr>
+    <a:masterClrMapping/>
+  </p:clrMapOvr>
+  <p:transition/>
+</p:sld>
+</file>
+
+<file path=ppt/slides/slide22.xml><?xml version="1.0" encoding="utf-8"?>
 <p:sld xmlns:a="http://schemas.openxmlformats.org/drawingml/2006/main" xmlns:r="http://schemas.openxmlformats.org/officeDocument/2006/relationships" xmlns:p="http://schemas.openxmlformats.org/presentationml/2006/main">
   <p:cSld>
     <p:spTree>
@@ -13781,49 +14277,32 @@
           <a:p>
             <a:r>
               <a:rPr lang="en-US" dirty="0" smtClean="0"/>
-              <a:t>Reach a relative percent difference of less than 1%</a:t>
+              <a:t>Add 5 efficiency plots for experimental verse MCNP</a:t>
             </a:r>
           </a:p>
           <a:p>
             <a:pPr lvl="1"/>
             <a:r>
               <a:rPr lang="en-US" dirty="0" smtClean="0"/>
-              <a:t>Increase adjustable parameters</a:t>
+              <a:t>Include a table for each too</a:t>
             </a:r>
           </a:p>
           <a:p>
-            <a:pPr lvl="1"/>
             <a:r>
               <a:rPr lang="en-US" dirty="0" smtClean="0"/>
-              <a:t>Obtain more information about internal components of HPGe</a:t>
+              <a:t>1 plot for the combined optimal parameters</a:t>
             </a:r>
           </a:p>
           <a:p>
             <a:r>
               <a:rPr lang="en-US" dirty="0" smtClean="0"/>
-              <a:t>Generalize automated optimization code for other applications:</a:t>
+              <a:t>Advantage results?</a:t>
             </a:r>
-            <a:endParaRPr lang="en-US" dirty="0"/>
-          </a:p>
-          <a:p>
-            <a:pPr lvl="1"/>
+          </a:p>
+          <a:p>
             <a:r>
               <a:rPr lang="en-US" dirty="0" smtClean="0"/>
-              <a:t>Other detectors</a:t>
-            </a:r>
-          </a:p>
-          <a:p>
-            <a:pPr lvl="1"/>
-            <a:r>
-              <a:rPr lang="en-US" dirty="0" smtClean="0"/>
-              <a:t>Usable on other operating systems</a:t>
-            </a:r>
-          </a:p>
-          <a:p>
-            <a:pPr lvl="1"/>
-            <a:r>
-              <a:rPr lang="en-US" dirty="0" smtClean="0"/>
-              <a:t>Automated characterization simulations with benchmarked models</a:t>
+              <a:t>Include final value for relative uncertainty</a:t>
             </a:r>
           </a:p>
         </p:txBody>
@@ -13849,7 +14328,7 @@
                   <a:srgbClr val="FF0000"/>
                 </a:solidFill>
               </a:rPr>
-              <a:t>Future Work</a:t>
+              <a:t>Results</a:t>
             </a:r>
             <a:endParaRPr lang="en-US" dirty="0">
               <a:solidFill>
@@ -13882,9 +14361,501 @@
               <a:pPr>
                 <a:defRPr/>
               </a:pPr>
-              <a:t>21</a:t>
+              <a:t>22</a:t>
             </a:fld>
-            <a:endParaRPr lang="en-US"/>
+            <a:endParaRPr lang="en-US" dirty="0"/>
+          </a:p>
+        </p:txBody>
+      </p:sp>
+    </p:spTree>
+    <p:extLst>
+      <p:ext uri="{BB962C8B-B14F-4D97-AF65-F5344CB8AC3E}">
+        <p14:creationId xmlns:p14="http://schemas.microsoft.com/office/powerpoint/2010/main" val="2104524501"/>
+      </p:ext>
+    </p:extLst>
+  </p:cSld>
+  <p:clrMapOvr>
+    <a:masterClrMapping/>
+  </p:clrMapOvr>
+  <p:transition/>
+  <p:timing>
+    <p:tnLst>
+      <p:par>
+        <p:cTn id="1" dur="indefinite" restart="never" nodeType="tmRoot">
+          <p:childTnLst>
+            <p:seq concurrent="1" nextAc="seek">
+              <p:cTn id="2" dur="indefinite" nodeType="mainSeq">
+                <p:childTnLst>
+                  <p:par>
+                    <p:cTn id="3" fill="hold">
+                      <p:stCondLst>
+                        <p:cond delay="indefinite"/>
+                        <p:cond evt="onBegin" delay="0">
+                          <p:tn val="2"/>
+                        </p:cond>
+                      </p:stCondLst>
+                      <p:childTnLst>
+                        <p:par>
+                          <p:cTn id="4" fill="hold">
+                            <p:stCondLst>
+                              <p:cond delay="0"/>
+                            </p:stCondLst>
+                            <p:childTnLst>
+                              <p:par>
+                                <p:cTn id="5" presetID="1" presetClass="entr" presetSubtype="0" fill="hold" nodeType="withEffect">
+                                  <p:stCondLst>
+                                    <p:cond delay="0"/>
+                                  </p:stCondLst>
+                                  <p:childTnLst>
+                                    <p:set>
+                                      <p:cBhvr>
+                                        <p:cTn id="6" dur="1" fill="hold">
+                                          <p:stCondLst>
+                                            <p:cond delay="0"/>
+                                          </p:stCondLst>
+                                        </p:cTn>
+                                        <p:tgtEl>
+                                          <p:spTgt spid="2">
+                                            <p:txEl>
+                                              <p:pRg st="0" end="0"/>
+                                            </p:txEl>
+                                          </p:spTgt>
+                                        </p:tgtEl>
+                                        <p:attrNameLst>
+                                          <p:attrName>style.visibility</p:attrName>
+                                        </p:attrNameLst>
+                                      </p:cBhvr>
+                                      <p:to>
+                                        <p:strVal val="visible"/>
+                                      </p:to>
+                                    </p:set>
+                                  </p:childTnLst>
+                                </p:cTn>
+                              </p:par>
+                              <p:par>
+                                <p:cTn id="7" presetID="1" presetClass="entr" presetSubtype="0" fill="hold" nodeType="withEffect">
+                                  <p:stCondLst>
+                                    <p:cond delay="0"/>
+                                  </p:stCondLst>
+                                  <p:childTnLst>
+                                    <p:set>
+                                      <p:cBhvr>
+                                        <p:cTn id="8" dur="1" fill="hold">
+                                          <p:stCondLst>
+                                            <p:cond delay="0"/>
+                                          </p:stCondLst>
+                                        </p:cTn>
+                                        <p:tgtEl>
+                                          <p:spTgt spid="2">
+                                            <p:txEl>
+                                              <p:pRg st="1" end="1"/>
+                                            </p:txEl>
+                                          </p:spTgt>
+                                        </p:tgtEl>
+                                        <p:attrNameLst>
+                                          <p:attrName>style.visibility</p:attrName>
+                                        </p:attrNameLst>
+                                      </p:cBhvr>
+                                      <p:to>
+                                        <p:strVal val="visible"/>
+                                      </p:to>
+                                    </p:set>
+                                  </p:childTnLst>
+                                </p:cTn>
+                              </p:par>
+                              <p:par>
+                                <p:cTn id="9" presetID="1" presetClass="entr" presetSubtype="0" fill="hold" nodeType="withEffect">
+                                  <p:stCondLst>
+                                    <p:cond delay="0"/>
+                                  </p:stCondLst>
+                                  <p:childTnLst>
+                                    <p:set>
+                                      <p:cBhvr>
+                                        <p:cTn id="10" dur="1" fill="hold">
+                                          <p:stCondLst>
+                                            <p:cond delay="0"/>
+                                          </p:stCondLst>
+                                        </p:cTn>
+                                        <p:tgtEl>
+                                          <p:spTgt spid="2">
+                                            <p:txEl>
+                                              <p:pRg st="2" end="2"/>
+                                            </p:txEl>
+                                          </p:spTgt>
+                                        </p:tgtEl>
+                                        <p:attrNameLst>
+                                          <p:attrName>style.visibility</p:attrName>
+                                        </p:attrNameLst>
+                                      </p:cBhvr>
+                                      <p:to>
+                                        <p:strVal val="visible"/>
+                                      </p:to>
+                                    </p:set>
+                                  </p:childTnLst>
+                                </p:cTn>
+                              </p:par>
+                              <p:par>
+                                <p:cTn id="11" presetID="1" presetClass="entr" presetSubtype="0" fill="hold" nodeType="withEffect">
+                                  <p:stCondLst>
+                                    <p:cond delay="0"/>
+                                  </p:stCondLst>
+                                  <p:childTnLst>
+                                    <p:set>
+                                      <p:cBhvr>
+                                        <p:cTn id="12" dur="1" fill="hold">
+                                          <p:stCondLst>
+                                            <p:cond delay="0"/>
+                                          </p:stCondLst>
+                                        </p:cTn>
+                                        <p:tgtEl>
+                                          <p:spTgt spid="2">
+                                            <p:txEl>
+                                              <p:pRg st="3" end="3"/>
+                                            </p:txEl>
+                                          </p:spTgt>
+                                        </p:tgtEl>
+                                        <p:attrNameLst>
+                                          <p:attrName>style.visibility</p:attrName>
+                                        </p:attrNameLst>
+                                      </p:cBhvr>
+                                      <p:to>
+                                        <p:strVal val="visible"/>
+                                      </p:to>
+                                    </p:set>
+                                  </p:childTnLst>
+                                </p:cTn>
+                              </p:par>
+                              <p:par>
+                                <p:cTn id="13" presetID="1" presetClass="entr" presetSubtype="0" fill="hold" nodeType="withEffect">
+                                  <p:stCondLst>
+                                    <p:cond delay="0"/>
+                                  </p:stCondLst>
+                                  <p:childTnLst>
+                                    <p:set>
+                                      <p:cBhvr>
+                                        <p:cTn id="14" dur="1" fill="hold">
+                                          <p:stCondLst>
+                                            <p:cond delay="0"/>
+                                          </p:stCondLst>
+                                        </p:cTn>
+                                        <p:tgtEl>
+                                          <p:spTgt spid="2">
+                                            <p:txEl>
+                                              <p:pRg st="4" end="4"/>
+                                            </p:txEl>
+                                          </p:spTgt>
+                                        </p:tgtEl>
+                                        <p:attrNameLst>
+                                          <p:attrName>style.visibility</p:attrName>
+                                        </p:attrNameLst>
+                                      </p:cBhvr>
+                                      <p:to>
+                                        <p:strVal val="visible"/>
+                                      </p:to>
+                                    </p:set>
+                                  </p:childTnLst>
+                                </p:cTn>
+                              </p:par>
+                            </p:childTnLst>
+                          </p:cTn>
+                        </p:par>
+                      </p:childTnLst>
+                    </p:cTn>
+                  </p:par>
+                </p:childTnLst>
+              </p:cTn>
+              <p:prevCondLst>
+                <p:cond evt="onPrev" delay="0">
+                  <p:tgtEl>
+                    <p:sldTgt/>
+                  </p:tgtEl>
+                </p:cond>
+              </p:prevCondLst>
+              <p:nextCondLst>
+                <p:cond evt="onNext" delay="0">
+                  <p:tgtEl>
+                    <p:sldTgt/>
+                  </p:tgtEl>
+                </p:cond>
+              </p:nextCondLst>
+            </p:seq>
+          </p:childTnLst>
+        </p:cTn>
+      </p:par>
+    </p:tnLst>
+  </p:timing>
+</p:sld>
+</file>
+
+<file path=ppt/slides/slide23.xml><?xml version="1.0" encoding="utf-8"?>
+<p:sld xmlns:a="http://schemas.openxmlformats.org/drawingml/2006/main" xmlns:r="http://schemas.openxmlformats.org/officeDocument/2006/relationships" xmlns:p="http://schemas.openxmlformats.org/presentationml/2006/main">
+  <p:cSld>
+    <p:spTree>
+      <p:nvGrpSpPr>
+        <p:cNvPr id="1" name=""/>
+        <p:cNvGrpSpPr/>
+        <p:nvPr/>
+      </p:nvGrpSpPr>
+      <p:grpSpPr>
+        <a:xfrm>
+          <a:off x="0" y="0"/>
+          <a:ext cx="0" cy="0"/>
+          <a:chOff x="0" y="0"/>
+          <a:chExt cx="0" cy="0"/>
+        </a:xfrm>
+      </p:grpSpPr>
+      <p:sp>
+        <p:nvSpPr>
+          <p:cNvPr id="2" name="Title 1"/>
+          <p:cNvSpPr>
+            <a:spLocks noGrp="1"/>
+          </p:cNvSpPr>
+          <p:nvPr>
+            <p:ph type="title"/>
+          </p:nvPr>
+        </p:nvSpPr>
+        <p:spPr/>
+        <p:txBody>
+          <a:bodyPr/>
+          <a:lstStyle/>
+          <a:p>
+            <a:r>
+              <a:rPr lang="en-US" dirty="0" smtClean="0">
+                <a:solidFill>
+                  <a:srgbClr val="FF0000"/>
+                </a:solidFill>
+              </a:rPr>
+              <a:t>Conclusion</a:t>
+            </a:r>
+            <a:endParaRPr lang="en-US" dirty="0">
+              <a:solidFill>
+                <a:srgbClr val="FF0000"/>
+              </a:solidFill>
+            </a:endParaRPr>
+          </a:p>
+        </p:txBody>
+      </p:sp>
+      <p:sp>
+        <p:nvSpPr>
+          <p:cNvPr id="3" name="Content Placeholder 2"/>
+          <p:cNvSpPr>
+            <a:spLocks noGrp="1"/>
+          </p:cNvSpPr>
+          <p:nvPr>
+            <p:ph idx="1"/>
+          </p:nvPr>
+        </p:nvSpPr>
+        <p:spPr/>
+        <p:txBody>
+          <a:bodyPr/>
+          <a:lstStyle/>
+          <a:p>
+            <a:r>
+              <a:rPr lang="en-US" dirty="0" smtClean="0"/>
+              <a:t>How close were we?</a:t>
+            </a:r>
+          </a:p>
+          <a:p>
+            <a:r>
+              <a:rPr lang="en-US" dirty="0" smtClean="0"/>
+              <a:t>Does our method work?</a:t>
+            </a:r>
+          </a:p>
+          <a:p>
+            <a:r>
+              <a:rPr lang="en-US" dirty="0" smtClean="0"/>
+              <a:t>Anything?</a:t>
+            </a:r>
+            <a:endParaRPr lang="en-US" dirty="0"/>
+          </a:p>
+        </p:txBody>
+      </p:sp>
+      <p:sp>
+        <p:nvSpPr>
+          <p:cNvPr id="4" name="Slide Number Placeholder 3"/>
+          <p:cNvSpPr>
+            <a:spLocks noGrp="1"/>
+          </p:cNvSpPr>
+          <p:nvPr>
+            <p:ph type="sldNum" sz="quarter" idx="10"/>
+          </p:nvPr>
+        </p:nvSpPr>
+        <p:spPr/>
+        <p:txBody>
+          <a:bodyPr/>
+          <a:lstStyle/>
+          <a:p>
+            <a:pPr>
+              <a:defRPr/>
+            </a:pPr>
+            <a:fld id="{19845459-3F1B-4F43-8FC0-35ADCE8623CC}" type="slidenum">
+              <a:rPr lang="en-US" smtClean="0"/>
+              <a:pPr>
+                <a:defRPr/>
+              </a:pPr>
+              <a:t>23</a:t>
+            </a:fld>
+            <a:endParaRPr lang="en-US" dirty="0"/>
+          </a:p>
+        </p:txBody>
+      </p:sp>
+    </p:spTree>
+    <p:extLst>
+      <p:ext uri="{BB962C8B-B14F-4D97-AF65-F5344CB8AC3E}">
+        <p14:creationId xmlns:p14="http://schemas.microsoft.com/office/powerpoint/2010/main" val="3115579710"/>
+      </p:ext>
+    </p:extLst>
+  </p:cSld>
+  <p:clrMapOvr>
+    <a:masterClrMapping/>
+  </p:clrMapOvr>
+  <p:transition/>
+</p:sld>
+</file>
+
+<file path=ppt/slides/slide24.xml><?xml version="1.0" encoding="utf-8"?>
+<p:sld xmlns:a="http://schemas.openxmlformats.org/drawingml/2006/main" xmlns:r="http://schemas.openxmlformats.org/officeDocument/2006/relationships" xmlns:p="http://schemas.openxmlformats.org/presentationml/2006/main">
+  <p:cSld>
+    <p:spTree>
+      <p:nvGrpSpPr>
+        <p:cNvPr id="1" name=""/>
+        <p:cNvGrpSpPr/>
+        <p:nvPr/>
+      </p:nvGrpSpPr>
+      <p:grpSpPr>
+        <a:xfrm>
+          <a:off x="0" y="0"/>
+          <a:ext cx="0" cy="0"/>
+          <a:chOff x="0" y="0"/>
+          <a:chExt cx="0" cy="0"/>
+        </a:xfrm>
+      </p:grpSpPr>
+      <p:sp>
+        <p:nvSpPr>
+          <p:cNvPr id="2" name="Content Placeholder 1"/>
+          <p:cNvSpPr>
+            <a:spLocks noGrp="1"/>
+          </p:cNvSpPr>
+          <p:nvPr>
+            <p:ph idx="1"/>
+          </p:nvPr>
+        </p:nvSpPr>
+        <p:spPr>
+          <a:xfrm>
+            <a:off x="304800" y="1295400"/>
+            <a:ext cx="8534400" cy="4876800"/>
+          </a:xfrm>
+        </p:spPr>
+        <p:txBody>
+          <a:bodyPr/>
+          <a:lstStyle/>
+          <a:p>
+            <a:r>
+              <a:rPr lang="en-US" dirty="0" smtClean="0"/>
+              <a:t>Reach a relative percent difference of less than 1%</a:t>
+            </a:r>
+          </a:p>
+          <a:p>
+            <a:pPr lvl="1"/>
+            <a:r>
+              <a:rPr lang="en-US" dirty="0" smtClean="0"/>
+              <a:t>Increase adjustable parameters</a:t>
+            </a:r>
+          </a:p>
+          <a:p>
+            <a:pPr lvl="1"/>
+            <a:r>
+              <a:rPr lang="en-US" dirty="0" smtClean="0"/>
+              <a:t>Obtain more information about internal components of HPGe</a:t>
+            </a:r>
+          </a:p>
+          <a:p>
+            <a:r>
+              <a:rPr lang="en-US" dirty="0" smtClean="0"/>
+              <a:t>Generalize automated optimization code for other applications:</a:t>
+            </a:r>
+            <a:endParaRPr lang="en-US" dirty="0"/>
+          </a:p>
+          <a:p>
+            <a:pPr lvl="1"/>
+            <a:r>
+              <a:rPr lang="en-US" dirty="0" smtClean="0"/>
+              <a:t>Other detectors</a:t>
+            </a:r>
+          </a:p>
+          <a:p>
+            <a:pPr lvl="1"/>
+            <a:r>
+              <a:rPr lang="en-US" dirty="0" smtClean="0"/>
+              <a:t>Usable on other operating systems</a:t>
+            </a:r>
+          </a:p>
+          <a:p>
+            <a:pPr lvl="1"/>
+            <a:r>
+              <a:rPr lang="en-US" dirty="0" smtClean="0"/>
+              <a:t>Automated characterization simulations with benchmarked models</a:t>
+            </a:r>
+          </a:p>
+        </p:txBody>
+      </p:sp>
+      <p:sp>
+        <p:nvSpPr>
+          <p:cNvPr id="10241" name="Title 1"/>
+          <p:cNvSpPr>
+            <a:spLocks noGrp="1"/>
+          </p:cNvSpPr>
+          <p:nvPr>
+            <p:ph type="title"/>
+          </p:nvPr>
+        </p:nvSpPr>
+        <p:spPr/>
+        <p:txBody>
+          <a:bodyPr/>
+          <a:lstStyle/>
+          <a:p>
+            <a:r>
+              <a:rPr lang="en-US" dirty="0" smtClean="0">
+                <a:solidFill>
+                  <a:srgbClr val="FF0000"/>
+                </a:solidFill>
+              </a:rPr>
+              <a:t>Future Work</a:t>
+            </a:r>
+            <a:endParaRPr lang="en-US" dirty="0">
+              <a:solidFill>
+                <a:srgbClr val="FF0000"/>
+              </a:solidFill>
+            </a:endParaRPr>
+          </a:p>
+        </p:txBody>
+      </p:sp>
+      <p:sp>
+        <p:nvSpPr>
+          <p:cNvPr id="3" name="Slide Number Placeholder 2"/>
+          <p:cNvSpPr>
+            <a:spLocks noGrp="1"/>
+          </p:cNvSpPr>
+          <p:nvPr>
+            <p:ph type="sldNum" sz="quarter" idx="10"/>
+          </p:nvPr>
+        </p:nvSpPr>
+        <p:spPr/>
+        <p:txBody>
+          <a:bodyPr/>
+          <a:lstStyle/>
+          <a:p>
+            <a:pPr>
+              <a:defRPr/>
+            </a:pPr>
+            <a:fld id="{54D80F8A-463A-4890-BC87-BDB129B2791E}" type="slidenum">
+              <a:rPr lang="en-US" smtClean="0"/>
+              <a:pPr>
+                <a:defRPr/>
+              </a:pPr>
+              <a:t>24</a:t>
+            </a:fld>
+            <a:endParaRPr lang="en-US" dirty="0"/>
           </a:p>
         </p:txBody>
       </p:sp>
@@ -14170,7 +15141,7 @@
 </p:sld>
 </file>
 
-<file path=ppt/slides/slide22.xml><?xml version="1.0" encoding="utf-8"?>
+<file path=ppt/slides/slide25.xml><?xml version="1.0" encoding="utf-8"?>
 <p:sld xmlns:a="http://schemas.openxmlformats.org/drawingml/2006/main" xmlns:r="http://schemas.openxmlformats.org/officeDocument/2006/relationships" xmlns:p="http://schemas.openxmlformats.org/presentationml/2006/main">
   <p:cSld>
     <p:spTree>
@@ -14248,7 +15219,6 @@
               <a:rPr lang="en-US" dirty="0" smtClean="0"/>
               <a:t>Conclusions</a:t>
             </a:r>
-            <a:endParaRPr lang="en-US" dirty="0" smtClean="0"/>
           </a:p>
           <a:p>
             <a:r>
@@ -14304,9 +15274,9 @@
               <a:pPr>
                 <a:defRPr/>
               </a:pPr>
-              <a:t>22</a:t>
+              <a:t>25</a:t>
             </a:fld>
-            <a:endParaRPr lang="en-US"/>
+            <a:endParaRPr lang="en-US" dirty="0"/>
           </a:p>
         </p:txBody>
       </p:sp>
@@ -14653,7 +15623,7 @@
 </p:sld>
 </file>
 
-<file path=ppt/slides/slide23.xml><?xml version="1.0" encoding="utf-8"?>
+<file path=ppt/slides/slide26.xml><?xml version="1.0" encoding="utf-8"?>
 <p:sld xmlns:a="http://schemas.openxmlformats.org/drawingml/2006/main" xmlns:r="http://schemas.openxmlformats.org/officeDocument/2006/relationships" xmlns:p="http://schemas.openxmlformats.org/presentationml/2006/main">
   <p:cSld>
     <p:spTree>
@@ -14695,7 +15665,7 @@
               <a:t>Captain James </a:t>
             </a:r>
             <a:r>
-              <a:rPr lang="en-US" dirty="0" err="1" smtClean="0"/>
+              <a:rPr lang="en-US" dirty="0" smtClean="0"/>
               <a:t>Bevins</a:t>
             </a:r>
             <a:r>
@@ -14710,7 +15680,7 @@
               <a:t>Lt Colonel Buck </a:t>
             </a:r>
             <a:r>
-              <a:rPr lang="en-US" dirty="0" err="1" smtClean="0"/>
+              <a:rPr lang="en-US" dirty="0" smtClean="0"/>
               <a:t>O’Day</a:t>
             </a:r>
             <a:r>
@@ -14720,7 +15690,7 @@
           </a:p>
           <a:p>
             <a:r>
-              <a:rPr lang="en-US" dirty="0" err="1" smtClean="0"/>
+              <a:rPr lang="en-US" dirty="0" smtClean="0"/>
               <a:t>Capt</a:t>
             </a:r>
             <a:r>
@@ -14728,7 +15698,7 @@
               <a:t> </a:t>
             </a:r>
             <a:r>
-              <a:rPr lang="en-US" dirty="0" err="1" smtClean="0"/>
+              <a:rPr lang="en-US" dirty="0" smtClean="0"/>
               <a:t>Bevins</a:t>
             </a:r>
             <a:r>
@@ -14795,9 +15765,9 @@
               <a:pPr>
                 <a:defRPr/>
               </a:pPr>
-              <a:t>23</a:t>
+              <a:t>26</a:t>
             </a:fld>
-            <a:endParaRPr lang="en-US"/>
+            <a:endParaRPr lang="en-US" dirty="0"/>
           </a:p>
         </p:txBody>
       </p:sp>
@@ -14959,7 +15929,7 @@
 </p:sld>
 </file>
 
-<file path=ppt/slides/slide24.xml><?xml version="1.0" encoding="utf-8"?>
+<file path=ppt/slides/slide27.xml><?xml version="1.0" encoding="utf-8"?>
 <p:sld xmlns:a="http://schemas.openxmlformats.org/drawingml/2006/main" xmlns:r="http://schemas.openxmlformats.org/officeDocument/2006/relationships" xmlns:p="http://schemas.openxmlformats.org/presentationml/2006/main">
   <p:cSld>
     <p:spTree>
@@ -15022,9 +15992,9 @@
               <a:pPr>
                 <a:defRPr/>
               </a:pPr>
-              <a:t>24</a:t>
+              <a:t>27</a:t>
             </a:fld>
-            <a:endParaRPr lang="en-US"/>
+            <a:endParaRPr lang="en-US" dirty="0"/>
           </a:p>
         </p:txBody>
       </p:sp>
@@ -15060,7 +16030,7 @@
               <a:t>[2] 	R. G. Helmer, R. G. Hardy, V. E. </a:t>
             </a:r>
             <a:r>
-              <a:rPr lang="en-US" sz="1400" dirty="0" err="1"/>
+              <a:rPr lang="en-US" sz="1400" dirty="0"/>
               <a:t>Iacob</a:t>
             </a:r>
             <a:r>
@@ -15077,7 +16047,7 @@
               <a:t>[3] 	W. F. R. R. K. M. D. O. S. C. A. C. A. X. d. S. </a:t>
             </a:r>
             <a:r>
-              <a:rPr lang="en-US" sz="1400" dirty="0" err="1"/>
+              <a:rPr lang="en-US" sz="1400" dirty="0"/>
               <a:t>Guilherme</a:t>
             </a:r>
             <a:r>
@@ -15085,7 +16055,7 @@
               <a:t> J. de S. </a:t>
             </a:r>
             <a:r>
-              <a:rPr lang="en-US" sz="1400" dirty="0" err="1"/>
+              <a:rPr lang="en-US" sz="1400" dirty="0"/>
               <a:t>Corrêa</a:t>
             </a:r>
             <a:r>
@@ -15093,7 +16063,7 @@
               <a:t>, "COMPUTATIONAL MODELING OF A HIGH PURITY GERMANIUM," in International Nuclear Atlantic Conference, Belo </a:t>
             </a:r>
             <a:r>
-              <a:rPr lang="en-US" sz="1400" dirty="0" err="1"/>
+              <a:rPr lang="en-US" sz="1400" dirty="0"/>
               <a:t>Horizonte,MG</a:t>
             </a:r>
             <a:r>
@@ -15119,7 +16089,7 @@
               <a:t>[5] 	D. K. P. S. J. G. M. Jeremy Lloyd </a:t>
             </a:r>
             <a:r>
-              <a:rPr lang="en-US" sz="1400" dirty="0" err="1"/>
+              <a:rPr lang="en-US" sz="1400" dirty="0"/>
               <a:t>Conlin</a:t>
             </a:r>
             <a:r>
@@ -15136,7 +16106,7 @@
               <a:t>[6] 	C. G. R. P. R. R. R. W. I. RJ </a:t>
             </a:r>
             <a:r>
-              <a:rPr lang="en-US" sz="1400" dirty="0" err="1"/>
+              <a:rPr lang="en-US" sz="1400" dirty="0"/>
               <a:t>McConn</a:t>
             </a:r>
             <a:r>
@@ -15153,7 +16123,7 @@
               <a:t>[7] 	R. E. F. J. K. </a:t>
             </a:r>
             <a:r>
-              <a:rPr lang="en-US" sz="1400" dirty="0" err="1"/>
+              <a:rPr lang="en-US" sz="1400" dirty="0"/>
               <a:t>Shultis</a:t>
             </a:r>
             <a:r>
@@ -15189,7 +16159,7 @@
 </p:sld>
 </file>
 
-<file path=ppt/slides/slide25.xml><?xml version="1.0" encoding="utf-8"?>
+<file path=ppt/slides/slide28.xml><?xml version="1.0" encoding="utf-8"?>
 <p:sld xmlns:a="http://schemas.openxmlformats.org/drawingml/2006/main" xmlns:r="http://schemas.openxmlformats.org/officeDocument/2006/relationships" xmlns:p="http://schemas.openxmlformats.org/presentationml/2006/main">
   <p:cSld>
     <p:spTree>
@@ -15252,9 +16222,9 @@
               <a:pPr>
                 <a:defRPr/>
               </a:pPr>
-              <a:t>25</a:t>
+              <a:t>28</a:t>
             </a:fld>
-            <a:endParaRPr lang="en-US"/>
+            <a:endParaRPr lang="en-US" dirty="0"/>
           </a:p>
         </p:txBody>
       </p:sp>
@@ -15319,8 +16289,8 @@
           </a:p>
         </p:txBody>
       </p:sp>
-      <mc:AlternateContent xmlns:mc="http://schemas.openxmlformats.org/markup-compatibility/2006" xmlns:a14="http://schemas.microsoft.com/office/drawing/2010/main">
-        <mc:Choice Requires="a14">
+      <mc:AlternateContent xmlns:mc="http://schemas.openxmlformats.org/markup-compatibility/2006">
+        <mc:Choice xmlns:a14="http://schemas.microsoft.com/office/drawing/2010/main" Requires="a14">
           <p:sp>
             <p:nvSpPr>
               <p:cNvPr id="3" name="Content Placeholder 2"/>
@@ -15508,7 +16478,7 @@
                   <a:t>Perform an </a:t>
                 </a:r>
                 <a:r>
-                  <a:rPr lang="en-US" dirty="0" err="1" smtClean="0"/>
+                  <a:rPr lang="en-US" dirty="0" smtClean="0"/>
                   <a:t>adjoint</a:t>
                 </a:r>
                 <a:r>
@@ -15524,7 +16494,7 @@
             </p:txBody>
           </p:sp>
         </mc:Choice>
-        <mc:Fallback xmlns="">
+        <mc:Fallback>
           <p:sp>
             <p:nvSpPr>
               <p:cNvPr id="3" name="Content Placeholder 2"/>
@@ -15583,7 +16553,7 @@
               </a:pPr>
               <a:t>3</a:t>
             </a:fld>
-            <a:endParaRPr lang="en-US"/>
+            <a:endParaRPr lang="en-US" dirty="0"/>
           </a:p>
         </p:txBody>
       </p:sp>
@@ -15727,7 +16697,7 @@
               </a:pPr>
               <a:t>4</a:t>
             </a:fld>
-            <a:endParaRPr lang="en-US"/>
+            <a:endParaRPr lang="en-US" dirty="0"/>
           </a:p>
         </p:txBody>
       </p:sp>
@@ -15931,7 +16901,7 @@
               <a:t>Performed by Lt Col </a:t>
             </a:r>
             <a:r>
-              <a:rPr lang="en-US" dirty="0" err="1" smtClean="0"/>
+              <a:rPr lang="en-US" dirty="0" smtClean="0"/>
               <a:t>O’Day</a:t>
             </a:r>
             <a:r>
@@ -16009,7 +16979,7 @@
               </a:pPr>
               <a:t>5</a:t>
             </a:fld>
-            <a:endParaRPr lang="en-US"/>
+            <a:endParaRPr lang="en-US" dirty="0"/>
           </a:p>
         </p:txBody>
       </p:sp>
@@ -16243,8 +17213,8 @@
           <a:chExt cx="0" cy="0"/>
         </a:xfrm>
       </p:grpSpPr>
-      <mc:AlternateContent xmlns:mc="http://schemas.openxmlformats.org/markup-compatibility/2006" xmlns:a14="http://schemas.microsoft.com/office/drawing/2010/main">
-        <mc:Choice Requires="a14">
+      <mc:AlternateContent xmlns:mc="http://schemas.openxmlformats.org/markup-compatibility/2006">
+        <mc:Choice xmlns:a14="http://schemas.microsoft.com/office/drawing/2010/main" Requires="a14">
           <p:sp>
             <p:nvSpPr>
               <p:cNvPr id="2" name="Content Placeholder 1"/>
@@ -16270,7 +17240,7 @@
                   <a:t>Canberra Standard Electrode Ge Detector (</a:t>
                 </a:r>
                 <a:r>
-                  <a:rPr lang="en-US" dirty="0" err="1" smtClean="0"/>
+                  <a:rPr lang="en-US" dirty="0" smtClean="0"/>
                   <a:t>SEGe</a:t>
                 </a:r>
                 <a:r>
@@ -16311,7 +17281,7 @@
                   <a:t>Resolution: 1.20 </a:t>
                 </a:r>
                 <a:r>
-                  <a:rPr lang="en-US" dirty="0" err="1" smtClean="0"/>
+                  <a:rPr lang="en-US" dirty="0" smtClean="0"/>
                   <a:t>keV</a:t>
                 </a:r>
                 <a:r>
@@ -16319,7 +17289,7 @@
                   <a:t> at 122  </a:t>
                 </a:r>
                 <a:r>
-                  <a:rPr lang="en-US" dirty="0" err="1" smtClean="0"/>
+                  <a:rPr lang="en-US" dirty="0" smtClean="0"/>
                   <a:t>keV</a:t>
                 </a:r>
                 <a:r>
@@ -16343,7 +17313,7 @@
             </p:txBody>
           </p:sp>
         </mc:Choice>
-        <mc:Fallback xmlns="">
+        <mc:Fallback>
           <p:sp>
             <p:nvSpPr>
               <p:cNvPr id="2" name="Content Placeholder 1"/>
@@ -16429,7 +17399,7 @@
               </a:pPr>
               <a:t>6</a:t>
             </a:fld>
-            <a:endParaRPr lang="en-US"/>
+            <a:endParaRPr lang="en-US" dirty="0"/>
           </a:p>
         </p:txBody>
       </p:sp>
@@ -16485,7 +17455,7 @@
               <a:buNone/>
               <a:tabLst/>
             </a:pPr>
-            <a:endParaRPr kumimoji="0" lang="en-US" sz="1800" b="0" i="0" u="none" strike="noStrike" cap="none" normalizeH="0" baseline="0" smtClean="0">
+            <a:endParaRPr kumimoji="0" lang="en-US" sz="1800" b="0" i="0" u="none" strike="noStrike" cap="none" normalizeH="0" baseline="0" dirty="0" smtClean="0">
               <a:ln>
                 <a:noFill/>
               </a:ln>
@@ -16553,7 +17523,7 @@
               <a:buNone/>
               <a:tabLst/>
             </a:pPr>
-            <a:endParaRPr kumimoji="0" lang="en-US" sz="1800" b="0" i="0" u="none" strike="noStrike" cap="none" normalizeH="0" baseline="0" smtClean="0">
+            <a:endParaRPr kumimoji="0" lang="en-US" sz="1800" b="0" i="0" u="none" strike="noStrike" cap="none" normalizeH="0" baseline="0" dirty="0" smtClean="0">
               <a:ln>
                 <a:noFill/>
               </a:ln>
@@ -16618,7 +17588,7 @@
               <a:buNone/>
               <a:tabLst/>
             </a:pPr>
-            <a:endParaRPr kumimoji="0" lang="en-US" sz="1800" b="0" i="0" u="none" strike="noStrike" cap="none" normalizeH="0" baseline="0" smtClean="0">
+            <a:endParaRPr kumimoji="0" lang="en-US" sz="1800" b="0" i="0" u="none" strike="noStrike" cap="none" normalizeH="0" baseline="0" dirty="0" smtClean="0">
               <a:ln>
                 <a:noFill/>
               </a:ln>
@@ -17191,7 +18161,7 @@
               </a:pPr>
               <a:t>7</a:t>
             </a:fld>
-            <a:endParaRPr lang="en-US"/>
+            <a:endParaRPr lang="en-US" dirty="0"/>
           </a:p>
         </p:txBody>
       </p:sp>
@@ -17305,7 +18275,7 @@
               </a:pPr>
               <a:t>8</a:t>
             </a:fld>
-            <a:endParaRPr lang="en-US"/>
+            <a:endParaRPr lang="en-US" dirty="0"/>
           </a:p>
         </p:txBody>
       </p:sp>
@@ -17419,7 +18389,7 @@
               </a:pPr>
               <a:t>9</a:t>
             </a:fld>
-            <a:endParaRPr lang="en-US"/>
+            <a:endParaRPr lang="en-US" dirty="0"/>
           </a:p>
         </p:txBody>
       </p:sp>
@@ -17433,7 +18403,7 @@
             <p:ph idx="1"/>
             <p:extLst>
               <p:ext uri="{D42A27DB-BD31-4B8C-83A1-F6EECF244321}">
-                <p14:modId xmlns:p14="http://schemas.microsoft.com/office/powerpoint/2010/main" val="407897883"/>
+                <p14:modId xmlns:p14="http://schemas.microsoft.com/office/powerpoint/2010/main" val="3243216265"/>
               </p:ext>
             </p:extLst>
           </p:nvPr>
@@ -17476,16 +18446,7 @@
                           <a:ea typeface="Calibri" panose="020F0502020204030204" pitchFamily="34" charset="0"/>
                           <a:cs typeface="Times New Roman" panose="02020603050405020304" pitchFamily="18" charset="0"/>
                         </a:rPr>
-                        <a:t>Gamma-Ray Energy [</a:t>
-                      </a:r>
-                      <a:r>
-                        <a:rPr lang="en-US" sz="1200" b="1" dirty="0" err="1">
-                          <a:effectLst/>
-                          <a:latin typeface="Arial" panose="020B0604020202020204" pitchFamily="34" charset="0"/>
-                          <a:ea typeface="Calibri" panose="020F0502020204030204" pitchFamily="34" charset="0"/>
-                          <a:cs typeface="Times New Roman" panose="02020603050405020304" pitchFamily="18" charset="0"/>
-                        </a:rPr>
-                        <a:t>keV</a:t>
+                        <a:t>Gamma-Ray Energy [keV</a:t>
                       </a:r>
                       <a:r>
                         <a:rPr lang="en-US" sz="1200" b="1" dirty="0" smtClean="0">
@@ -17563,7 +18524,7 @@
                         </a:spcAft>
                       </a:pPr>
                       <a:r>
-                        <a:rPr lang="en-US" sz="1200" b="1">
+                        <a:rPr lang="en-US" sz="1200" b="1" dirty="0">
                           <a:effectLst/>
                           <a:latin typeface="Arial" panose="020B0604020202020204" pitchFamily="34" charset="0"/>
                           <a:ea typeface="Calibri" panose="020F0502020204030204" pitchFamily="34" charset="0"/>
@@ -17571,7 +18532,7 @@
                         </a:rPr>
                         <a:t>Nuclide</a:t>
                       </a:r>
-                      <a:endParaRPr lang="en-US" sz="1100">
+                      <a:endParaRPr lang="en-US" sz="1100" dirty="0">
                         <a:effectLst/>
                         <a:latin typeface="Calibri" panose="020F0502020204030204" pitchFamily="34" charset="0"/>
                         <a:ea typeface="Calibri" panose="020F0502020204030204" pitchFamily="34" charset="0"/>
@@ -17638,7 +18599,7 @@
                         </a:spcAft>
                       </a:pPr>
                       <a:r>
-                        <a:rPr lang="en-US" sz="1200" b="1">
+                        <a:rPr lang="en-US" sz="1200" b="1" dirty="0">
                           <a:effectLst/>
                           <a:latin typeface="Arial" panose="020B0604020202020204" pitchFamily="34" charset="0"/>
                           <a:ea typeface="Calibri" panose="020F0502020204030204" pitchFamily="34" charset="0"/>
@@ -17646,7 +18607,7 @@
                         </a:rPr>
                         <a:t>Activity [µCi]</a:t>
                       </a:r>
-                      <a:endParaRPr lang="en-US" sz="1100">
+                      <a:endParaRPr lang="en-US" sz="1100" dirty="0">
                         <a:effectLst/>
                         <a:latin typeface="Calibri" panose="020F0502020204030204" pitchFamily="34" charset="0"/>
                         <a:ea typeface="Calibri" panose="020F0502020204030204" pitchFamily="34" charset="0"/>
@@ -17713,7 +18674,7 @@
                         </a:spcAft>
                       </a:pPr>
                       <a:r>
-                        <a:rPr lang="en-US" sz="1200" b="1">
+                        <a:rPr lang="en-US" sz="1200" b="1" dirty="0">
                           <a:effectLst/>
                           <a:latin typeface="Arial" panose="020B0604020202020204" pitchFamily="34" charset="0"/>
                           <a:ea typeface="Calibri" panose="020F0502020204030204" pitchFamily="34" charset="0"/>
@@ -17721,7 +18682,7 @@
                         </a:rPr>
                         <a:t>Gammas per Second</a:t>
                       </a:r>
-                      <a:endParaRPr lang="en-US" sz="1100">
+                      <a:endParaRPr lang="en-US" sz="1100" dirty="0">
                         <a:effectLst/>
                         <a:latin typeface="Calibri" panose="020F0502020204030204" pitchFamily="34" charset="0"/>
                         <a:ea typeface="Calibri" panose="020F0502020204030204" pitchFamily="34" charset="0"/>
@@ -17865,7 +18826,7 @@
                         </a:spcAft>
                       </a:pPr>
                       <a:r>
-                        <a:rPr lang="en-US" sz="1200">
+                        <a:rPr lang="en-US" sz="1200" dirty="0">
                           <a:effectLst/>
                           <a:latin typeface="Arial" panose="020B0604020202020204" pitchFamily="34" charset="0"/>
                           <a:ea typeface="Calibri" panose="020F0502020204030204" pitchFamily="34" charset="0"/>
@@ -17873,7 +18834,7 @@
                         </a:rPr>
                         <a:t>Am-241</a:t>
                       </a:r>
-                      <a:endParaRPr lang="en-US" sz="1100">
+                      <a:endParaRPr lang="en-US" sz="1100" dirty="0">
                         <a:effectLst/>
                         <a:latin typeface="Calibri" panose="020F0502020204030204" pitchFamily="34" charset="0"/>
                         <a:ea typeface="Calibri" panose="020F0502020204030204" pitchFamily="34" charset="0"/>
@@ -17940,7 +18901,7 @@
                         </a:spcAft>
                       </a:pPr>
                       <a:r>
-                        <a:rPr lang="en-US" sz="1200">
+                        <a:rPr lang="en-US" sz="1200" dirty="0">
                           <a:effectLst/>
                           <a:latin typeface="Arial" panose="020B0604020202020204" pitchFamily="34" charset="0"/>
                           <a:ea typeface="Calibri" panose="020F0502020204030204" pitchFamily="34" charset="0"/>
@@ -17948,7 +18909,7 @@
                         </a:rPr>
                         <a:t>0.02941</a:t>
                       </a:r>
-                      <a:endParaRPr lang="en-US" sz="1100">
+                      <a:endParaRPr lang="en-US" sz="1100" dirty="0">
                         <a:effectLst/>
                         <a:latin typeface="Calibri" panose="020F0502020204030204" pitchFamily="34" charset="0"/>
                         <a:ea typeface="Calibri" panose="020F0502020204030204" pitchFamily="34" charset="0"/>
@@ -18015,7 +18976,7 @@
                         </a:spcAft>
                       </a:pPr>
                       <a:r>
-                        <a:rPr lang="en-US" sz="1200">
+                        <a:rPr lang="en-US" sz="1200" dirty="0">
                           <a:effectLst/>
                           <a:latin typeface="Arial" panose="020B0604020202020204" pitchFamily="34" charset="0"/>
                           <a:ea typeface="Calibri" panose="020F0502020204030204" pitchFamily="34" charset="0"/>
@@ -18023,7 +18984,7 @@
                         </a:rPr>
                         <a:t>391.7</a:t>
                       </a:r>
-                      <a:endParaRPr lang="en-US" sz="1100">
+                      <a:endParaRPr lang="en-US" sz="1100" dirty="0">
                         <a:effectLst/>
                         <a:latin typeface="Calibri" panose="020F0502020204030204" pitchFamily="34" charset="0"/>
                         <a:ea typeface="Calibri" panose="020F0502020204030204" pitchFamily="34" charset="0"/>
@@ -18167,7 +19128,7 @@
                         </a:spcAft>
                       </a:pPr>
                       <a:r>
-                        <a:rPr lang="en-US" sz="1200">
+                        <a:rPr lang="en-US" sz="1200" dirty="0">
                           <a:effectLst/>
                           <a:latin typeface="Arial" panose="020B0604020202020204" pitchFamily="34" charset="0"/>
                           <a:ea typeface="Calibri" panose="020F0502020204030204" pitchFamily="34" charset="0"/>
@@ -18175,7 +19136,7 @@
                         </a:rPr>
                         <a:t>Cd-109</a:t>
                       </a:r>
-                      <a:endParaRPr lang="en-US" sz="1100">
+                      <a:endParaRPr lang="en-US" sz="1100" dirty="0">
                         <a:effectLst/>
                         <a:latin typeface="Calibri" panose="020F0502020204030204" pitchFamily="34" charset="0"/>
                         <a:ea typeface="Calibri" panose="020F0502020204030204" pitchFamily="34" charset="0"/>
@@ -18242,7 +19203,7 @@
                         </a:spcAft>
                       </a:pPr>
                       <a:r>
-                        <a:rPr lang="en-US" sz="1200">
+                        <a:rPr lang="en-US" sz="1200" dirty="0">
                           <a:effectLst/>
                           <a:latin typeface="Arial" panose="020B0604020202020204" pitchFamily="34" charset="0"/>
                           <a:ea typeface="Calibri" panose="020F0502020204030204" pitchFamily="34" charset="0"/>
@@ -18250,7 +19211,7 @@
                         </a:rPr>
                         <a:t>0.2707</a:t>
                       </a:r>
-                      <a:endParaRPr lang="en-US" sz="1100">
+                      <a:endParaRPr lang="en-US" sz="1100" dirty="0">
                         <a:effectLst/>
                         <a:latin typeface="Calibri" panose="020F0502020204030204" pitchFamily="34" charset="0"/>
                         <a:ea typeface="Calibri" panose="020F0502020204030204" pitchFamily="34" charset="0"/>
@@ -18317,7 +19278,7 @@
                         </a:spcAft>
                       </a:pPr>
                       <a:r>
-                        <a:rPr lang="en-US" sz="1200">
+                        <a:rPr lang="en-US" sz="1200" dirty="0">
                           <a:effectLst/>
                           <a:latin typeface="Arial" panose="020B0604020202020204" pitchFamily="34" charset="0"/>
                           <a:ea typeface="Calibri" panose="020F0502020204030204" pitchFamily="34" charset="0"/>
@@ -18325,7 +19286,7 @@
                         </a:rPr>
                         <a:t>363.6</a:t>
                       </a:r>
-                      <a:endParaRPr lang="en-US" sz="1100">
+                      <a:endParaRPr lang="en-US" sz="1100" dirty="0">
                         <a:effectLst/>
                         <a:latin typeface="Calibri" panose="020F0502020204030204" pitchFamily="34" charset="0"/>
                         <a:ea typeface="Calibri" panose="020F0502020204030204" pitchFamily="34" charset="0"/>
@@ -18544,7 +19505,7 @@
                         </a:spcAft>
                       </a:pPr>
                       <a:r>
-                        <a:rPr lang="en-US" sz="1200">
+                        <a:rPr lang="en-US" sz="1200" dirty="0">
                           <a:effectLst/>
                           <a:latin typeface="Arial" panose="020B0604020202020204" pitchFamily="34" charset="0"/>
                           <a:ea typeface="Calibri" panose="020F0502020204030204" pitchFamily="34" charset="0"/>
@@ -18552,7 +19513,7 @@
                         </a:rPr>
                         <a:t>0.01019</a:t>
                       </a:r>
-                      <a:endParaRPr lang="en-US" sz="1100">
+                      <a:endParaRPr lang="en-US" sz="1100" dirty="0">
                         <a:effectLst/>
                         <a:latin typeface="Calibri" panose="020F0502020204030204" pitchFamily="34" charset="0"/>
                         <a:ea typeface="Calibri" panose="020F0502020204030204" pitchFamily="34" charset="0"/>
@@ -18619,7 +19580,7 @@
                         </a:spcAft>
                       </a:pPr>
                       <a:r>
-                        <a:rPr lang="en-US" sz="1200">
+                        <a:rPr lang="en-US" sz="1200" dirty="0">
                           <a:effectLst/>
                           <a:latin typeface="Arial" panose="020B0604020202020204" pitchFamily="34" charset="0"/>
                           <a:ea typeface="Calibri" panose="020F0502020204030204" pitchFamily="34" charset="0"/>
@@ -18627,7 +19588,7 @@
                         </a:rPr>
                         <a:t>322.7</a:t>
                       </a:r>
-                      <a:endParaRPr lang="en-US" sz="1100">
+                      <a:endParaRPr lang="en-US" sz="1100" dirty="0">
                         <a:effectLst/>
                         <a:latin typeface="Calibri" panose="020F0502020204030204" pitchFamily="34" charset="0"/>
                         <a:ea typeface="Calibri" panose="020F0502020204030204" pitchFamily="34" charset="0"/>
@@ -18696,7 +19657,7 @@
                         </a:spcAft>
                       </a:pPr>
                       <a:r>
-                        <a:rPr lang="en-US" sz="1200">
+                        <a:rPr lang="en-US" sz="1200" dirty="0">
                           <a:effectLst/>
                           <a:latin typeface="Arial" panose="020B0604020202020204" pitchFamily="34" charset="0"/>
                           <a:ea typeface="Calibri" panose="020F0502020204030204" pitchFamily="34" charset="0"/>
@@ -18704,7 +19665,7 @@
                         </a:rPr>
                         <a:t>159</a:t>
                       </a:r>
-                      <a:endParaRPr lang="en-US" sz="1100">
+                      <a:endParaRPr lang="en-US" sz="1100" dirty="0">
                         <a:effectLst/>
                         <a:latin typeface="Calibri" panose="020F0502020204030204" pitchFamily="34" charset="0"/>
                         <a:ea typeface="Calibri" panose="020F0502020204030204" pitchFamily="34" charset="0"/>
@@ -18846,7 +19807,7 @@
                         </a:spcAft>
                       </a:pPr>
                       <a:r>
-                        <a:rPr lang="en-US" sz="1200">
+                        <a:rPr lang="en-US" sz="1200" dirty="0">
                           <a:effectLst/>
                           <a:latin typeface="Arial" panose="020B0604020202020204" pitchFamily="34" charset="0"/>
                           <a:ea typeface="Calibri" panose="020F0502020204030204" pitchFamily="34" charset="0"/>
@@ -18854,7 +19815,7 @@
                         </a:rPr>
                         <a:t>0.01403</a:t>
                       </a:r>
-                      <a:endParaRPr lang="en-US" sz="1100">
+                      <a:endParaRPr lang="en-US" sz="1100" dirty="0">
                         <a:effectLst/>
                         <a:latin typeface="Calibri" panose="020F0502020204030204" pitchFamily="34" charset="0"/>
                         <a:ea typeface="Calibri" panose="020F0502020204030204" pitchFamily="34" charset="0"/>
@@ -18921,7 +19882,7 @@
                         </a:spcAft>
                       </a:pPr>
                       <a:r>
-                        <a:rPr lang="en-US" sz="1200">
+                        <a:rPr lang="en-US" sz="1200" dirty="0">
                           <a:effectLst/>
                           <a:latin typeface="Arial" panose="020B0604020202020204" pitchFamily="34" charset="0"/>
                           <a:ea typeface="Calibri" panose="020F0502020204030204" pitchFamily="34" charset="0"/>
@@ -18929,7 +19890,7 @@
                         </a:rPr>
                         <a:t>436.1</a:t>
                       </a:r>
-                      <a:endParaRPr lang="en-US" sz="1100">
+                      <a:endParaRPr lang="en-US" sz="1100" dirty="0">
                         <a:effectLst/>
                         <a:latin typeface="Calibri" panose="020F0502020204030204" pitchFamily="34" charset="0"/>
                         <a:ea typeface="Calibri" panose="020F0502020204030204" pitchFamily="34" charset="0"/>
@@ -18998,7 +19959,7 @@
                         </a:spcAft>
                       </a:pPr>
                       <a:r>
-                        <a:rPr lang="en-US" sz="1200">
+                        <a:rPr lang="en-US" sz="1200" dirty="0">
                           <a:effectLst/>
                           <a:latin typeface="Arial" panose="020B0604020202020204" pitchFamily="34" charset="0"/>
                           <a:ea typeface="Calibri" panose="020F0502020204030204" pitchFamily="34" charset="0"/>
@@ -19006,7 +19967,7 @@
                         </a:rPr>
                         <a:t>320</a:t>
                       </a:r>
-                      <a:endParaRPr lang="en-US" sz="1100">
+                      <a:endParaRPr lang="en-US" sz="1100" dirty="0">
                         <a:effectLst/>
                         <a:latin typeface="Calibri" panose="020F0502020204030204" pitchFamily="34" charset="0"/>
                         <a:ea typeface="Calibri" panose="020F0502020204030204" pitchFamily="34" charset="0"/>
@@ -19148,7 +20109,7 @@
                         </a:spcAft>
                       </a:pPr>
                       <a:r>
-                        <a:rPr lang="en-US" sz="1200">
+                        <a:rPr lang="en-US" sz="1200" dirty="0">
                           <a:effectLst/>
                           <a:latin typeface="Arial" panose="020B0604020202020204" pitchFamily="34" charset="0"/>
                           <a:ea typeface="Calibri" panose="020F0502020204030204" pitchFamily="34" charset="0"/>
@@ -19156,7 +20117,7 @@
                         </a:rPr>
                         <a:t>0.3389</a:t>
                       </a:r>
-                      <a:endParaRPr lang="en-US" sz="1100">
+                      <a:endParaRPr lang="en-US" sz="1100" dirty="0">
                         <a:effectLst/>
                         <a:latin typeface="Calibri" panose="020F0502020204030204" pitchFamily="34" charset="0"/>
                         <a:ea typeface="Calibri" panose="020F0502020204030204" pitchFamily="34" charset="0"/>
@@ -19223,7 +20184,7 @@
                         </a:spcAft>
                       </a:pPr>
                       <a:r>
-                        <a:rPr lang="en-US" sz="1200">
+                        <a:rPr lang="en-US" sz="1200" dirty="0">
                           <a:effectLst/>
                           <a:latin typeface="Arial" panose="020B0604020202020204" pitchFamily="34" charset="0"/>
                           <a:ea typeface="Calibri" panose="020F0502020204030204" pitchFamily="34" charset="0"/>
@@ -19231,7 +20192,7 @@
                         </a:rPr>
                         <a:t>1236</a:t>
                       </a:r>
-                      <a:endParaRPr lang="en-US" sz="1100">
+                      <a:endParaRPr lang="en-US" sz="1100" dirty="0">
                         <a:effectLst/>
                         <a:latin typeface="Calibri" panose="020F0502020204030204" pitchFamily="34" charset="0"/>
                         <a:ea typeface="Calibri" panose="020F0502020204030204" pitchFamily="34" charset="0"/>
@@ -19300,7 +20261,7 @@
                         </a:spcAft>
                       </a:pPr>
                       <a:r>
-                        <a:rPr lang="en-US" sz="1200">
+                        <a:rPr lang="en-US" sz="1200" dirty="0">
                           <a:effectLst/>
                           <a:latin typeface="Arial" panose="020B0604020202020204" pitchFamily="34" charset="0"/>
                           <a:ea typeface="Calibri" panose="020F0502020204030204" pitchFamily="34" charset="0"/>
@@ -19308,7 +20269,7 @@
                         </a:rPr>
                         <a:t>392</a:t>
                       </a:r>
-                      <a:endParaRPr lang="en-US" sz="1100">
+                      <a:endParaRPr lang="en-US" sz="1100" dirty="0">
                         <a:effectLst/>
                         <a:latin typeface="Calibri" panose="020F0502020204030204" pitchFamily="34" charset="0"/>
                         <a:ea typeface="Calibri" panose="020F0502020204030204" pitchFamily="34" charset="0"/>
@@ -19450,7 +20411,7 @@
                         </a:spcAft>
                       </a:pPr>
                       <a:r>
-                        <a:rPr lang="en-US" sz="1200">
+                        <a:rPr lang="en-US" sz="1200" dirty="0">
                           <a:effectLst/>
                           <a:latin typeface="Arial" panose="020B0604020202020204" pitchFamily="34" charset="0"/>
                           <a:ea typeface="Calibri" panose="020F0502020204030204" pitchFamily="34" charset="0"/>
@@ -19458,7 +20419,7 @@
                         </a:rPr>
                         <a:t>0.05109</a:t>
                       </a:r>
-                      <a:endParaRPr lang="en-US" sz="1100">
+                      <a:endParaRPr lang="en-US" sz="1100" dirty="0">
                         <a:effectLst/>
                         <a:latin typeface="Calibri" panose="020F0502020204030204" pitchFamily="34" charset="0"/>
                         <a:ea typeface="Calibri" panose="020F0502020204030204" pitchFamily="34" charset="0"/>
@@ -19525,7 +20486,7 @@
                         </a:spcAft>
                       </a:pPr>
                       <a:r>
-                        <a:rPr lang="en-US" sz="1200">
+                        <a:rPr lang="en-US" sz="1200" dirty="0">
                           <a:effectLst/>
                           <a:latin typeface="Arial" panose="020B0604020202020204" pitchFamily="34" charset="0"/>
                           <a:ea typeface="Calibri" panose="020F0502020204030204" pitchFamily="34" charset="0"/>
@@ -19533,7 +20494,7 @@
                         </a:rPr>
                         <a:t>1227</a:t>
                       </a:r>
-                      <a:endParaRPr lang="en-US" sz="1100">
+                      <a:endParaRPr lang="en-US" sz="1100" dirty="0">
                         <a:effectLst/>
                         <a:latin typeface="Calibri" panose="020F0502020204030204" pitchFamily="34" charset="0"/>
                         <a:ea typeface="Calibri" panose="020F0502020204030204" pitchFamily="34" charset="0"/>
@@ -19602,7 +20563,7 @@
                         </a:spcAft>
                       </a:pPr>
                       <a:r>
-                        <a:rPr lang="en-US" sz="1200">
+                        <a:rPr lang="en-US" sz="1200" dirty="0">
                           <a:effectLst/>
                           <a:latin typeface="Arial" panose="020B0604020202020204" pitchFamily="34" charset="0"/>
                           <a:ea typeface="Calibri" panose="020F0502020204030204" pitchFamily="34" charset="0"/>
@@ -19610,7 +20571,7 @@
                         </a:rPr>
                         <a:t>514</a:t>
                       </a:r>
-                      <a:endParaRPr lang="en-US" sz="1100">
+                      <a:endParaRPr lang="en-US" sz="1100" dirty="0">
                         <a:effectLst/>
                         <a:latin typeface="Calibri" panose="020F0502020204030204" pitchFamily="34" charset="0"/>
                         <a:ea typeface="Calibri" panose="020F0502020204030204" pitchFamily="34" charset="0"/>
@@ -19677,7 +20638,7 @@
                         </a:spcAft>
                       </a:pPr>
                       <a:r>
-                        <a:rPr lang="en-US" sz="1200">
+                        <a:rPr lang="en-US" sz="1200" dirty="0">
                           <a:effectLst/>
                           <a:latin typeface="Arial" panose="020B0604020202020204" pitchFamily="34" charset="0"/>
                           <a:ea typeface="Calibri" panose="020F0502020204030204" pitchFamily="34" charset="0"/>
@@ -19685,7 +20646,7 @@
                         </a:rPr>
                         <a:t>Sr-85</a:t>
                       </a:r>
-                      <a:endParaRPr lang="en-US" sz="1100">
+                      <a:endParaRPr lang="en-US" sz="1100" dirty="0">
                         <a:effectLst/>
                         <a:latin typeface="Calibri" panose="020F0502020204030204" pitchFamily="34" charset="0"/>
                         <a:ea typeface="Calibri" panose="020F0502020204030204" pitchFamily="34" charset="0"/>
@@ -19827,7 +20788,7 @@
                         </a:spcAft>
                       </a:pPr>
                       <a:r>
-                        <a:rPr lang="en-US" sz="1200">
+                        <a:rPr lang="en-US" sz="1200" dirty="0">
                           <a:effectLst/>
                           <a:latin typeface="Arial" panose="020B0604020202020204" pitchFamily="34" charset="0"/>
                           <a:ea typeface="Calibri" panose="020F0502020204030204" pitchFamily="34" charset="0"/>
@@ -19835,7 +20796,7 @@
                         </a:rPr>
                         <a:t>2247</a:t>
                       </a:r>
-                      <a:endParaRPr lang="en-US" sz="1100">
+                      <a:endParaRPr lang="en-US" sz="1100" dirty="0">
                         <a:effectLst/>
                         <a:latin typeface="Calibri" panose="020F0502020204030204" pitchFamily="34" charset="0"/>
                         <a:ea typeface="Calibri" panose="020F0502020204030204" pitchFamily="34" charset="0"/>
@@ -19904,7 +20865,7 @@
                         </a:spcAft>
                       </a:pPr>
                       <a:r>
-                        <a:rPr lang="en-US" sz="1200">
+                        <a:rPr lang="en-US" sz="1200" dirty="0">
                           <a:effectLst/>
                           <a:latin typeface="Arial" panose="020B0604020202020204" pitchFamily="34" charset="0"/>
                           <a:ea typeface="Calibri" panose="020F0502020204030204" pitchFamily="34" charset="0"/>
@@ -19912,7 +20873,7 @@
                         </a:rPr>
                         <a:t>662</a:t>
                       </a:r>
-                      <a:endParaRPr lang="en-US" sz="1100">
+                      <a:endParaRPr lang="en-US" sz="1100" dirty="0">
                         <a:effectLst/>
                         <a:latin typeface="Calibri" panose="020F0502020204030204" pitchFamily="34" charset="0"/>
                         <a:ea typeface="Calibri" panose="020F0502020204030204" pitchFamily="34" charset="0"/>
@@ -19979,7 +20940,7 @@
                         </a:spcAft>
                       </a:pPr>
                       <a:r>
-                        <a:rPr lang="en-US" sz="1200">
+                        <a:rPr lang="en-US" sz="1200" dirty="0">
                           <a:effectLst/>
                           <a:latin typeface="Arial" panose="020B0604020202020204" pitchFamily="34" charset="0"/>
                           <a:ea typeface="Calibri" panose="020F0502020204030204" pitchFamily="34" charset="0"/>
@@ -19987,7 +20948,7 @@
                         </a:rPr>
                         <a:t>Cs-137</a:t>
                       </a:r>
-                      <a:endParaRPr lang="en-US" sz="1100">
+                      <a:endParaRPr lang="en-US" sz="1100" dirty="0">
                         <a:effectLst/>
                         <a:latin typeface="Calibri" panose="020F0502020204030204" pitchFamily="34" charset="0"/>
                         <a:ea typeface="Calibri" panose="020F0502020204030204" pitchFamily="34" charset="0"/>
@@ -20129,7 +21090,7 @@
                         </a:spcAft>
                       </a:pPr>
                       <a:r>
-                        <a:rPr lang="en-US" sz="1200">
+                        <a:rPr lang="en-US" sz="1200" dirty="0">
                           <a:effectLst/>
                           <a:latin typeface="Arial" panose="020B0604020202020204" pitchFamily="34" charset="0"/>
                           <a:ea typeface="Calibri" panose="020F0502020204030204" pitchFamily="34" charset="0"/>
@@ -20137,7 +21098,7 @@
                         </a:rPr>
                         <a:t>1362</a:t>
                       </a:r>
-                      <a:endParaRPr lang="en-US" sz="1100">
+                      <a:endParaRPr lang="en-US" sz="1100" dirty="0">
                         <a:effectLst/>
                         <a:latin typeface="Calibri" panose="020F0502020204030204" pitchFamily="34" charset="0"/>
                         <a:ea typeface="Calibri" panose="020F0502020204030204" pitchFamily="34" charset="0"/>
@@ -20206,7 +21167,7 @@
                         </a:spcAft>
                       </a:pPr>
                       <a:r>
-                        <a:rPr lang="en-US" sz="1200">
+                        <a:rPr lang="en-US" sz="1200" dirty="0">
                           <a:effectLst/>
                           <a:latin typeface="Arial" panose="020B0604020202020204" pitchFamily="34" charset="0"/>
                           <a:ea typeface="Calibri" panose="020F0502020204030204" pitchFamily="34" charset="0"/>
@@ -20214,7 +21175,7 @@
                         </a:rPr>
                         <a:t>898</a:t>
                       </a:r>
-                      <a:endParaRPr lang="en-US" sz="1100">
+                      <a:endParaRPr lang="en-US" sz="1100" dirty="0">
                         <a:effectLst/>
                         <a:latin typeface="Calibri" panose="020F0502020204030204" pitchFamily="34" charset="0"/>
                         <a:ea typeface="Calibri" panose="020F0502020204030204" pitchFamily="34" charset="0"/>
@@ -20281,7 +21242,7 @@
                         </a:spcAft>
                       </a:pPr>
                       <a:r>
-                        <a:rPr lang="en-US" sz="1200">
+                        <a:rPr lang="en-US" sz="1200" dirty="0">
                           <a:effectLst/>
                           <a:latin typeface="Arial" panose="020B0604020202020204" pitchFamily="34" charset="0"/>
                           <a:ea typeface="Calibri" panose="020F0502020204030204" pitchFamily="34" charset="0"/>
@@ -20289,7 +21250,7 @@
                         </a:rPr>
                         <a:t>Y-88</a:t>
                       </a:r>
-                      <a:endParaRPr lang="en-US" sz="1100">
+                      <a:endParaRPr lang="en-US" sz="1100" dirty="0">
                         <a:effectLst/>
                         <a:latin typeface="Calibri" panose="020F0502020204030204" pitchFamily="34" charset="0"/>
                         <a:ea typeface="Calibri" panose="020F0502020204030204" pitchFamily="34" charset="0"/>
@@ -20431,7 +21392,7 @@
                         </a:spcAft>
                       </a:pPr>
                       <a:r>
-                        <a:rPr lang="en-US" sz="1200">
+                        <a:rPr lang="en-US" sz="1200" dirty="0">
                           <a:effectLst/>
                           <a:latin typeface="Arial" panose="020B0604020202020204" pitchFamily="34" charset="0"/>
                           <a:ea typeface="Calibri" panose="020F0502020204030204" pitchFamily="34" charset="0"/>
@@ -20439,7 +21400,7 @@
                         </a:rPr>
                         <a:t>3347</a:t>
                       </a:r>
-                      <a:endParaRPr lang="en-US" sz="1100">
+                      <a:endParaRPr lang="en-US" sz="1100" dirty="0">
                         <a:effectLst/>
                         <a:latin typeface="Calibri" panose="020F0502020204030204" pitchFamily="34" charset="0"/>
                         <a:ea typeface="Calibri" panose="020F0502020204030204" pitchFamily="34" charset="0"/>
@@ -20508,7 +21469,7 @@
                         </a:spcAft>
                       </a:pPr>
                       <a:r>
-                        <a:rPr lang="en-US" sz="1200">
+                        <a:rPr lang="en-US" sz="1200" dirty="0">
                           <a:effectLst/>
                           <a:latin typeface="Arial" panose="020B0604020202020204" pitchFamily="34" charset="0"/>
                           <a:ea typeface="Calibri" panose="020F0502020204030204" pitchFamily="34" charset="0"/>
@@ -20516,7 +21477,7 @@
                         </a:rPr>
                         <a:t>1173</a:t>
                       </a:r>
-                      <a:endParaRPr lang="en-US" sz="1100">
+                      <a:endParaRPr lang="en-US" sz="1100" dirty="0">
                         <a:effectLst/>
                         <a:latin typeface="Calibri" panose="020F0502020204030204" pitchFamily="34" charset="0"/>
                         <a:ea typeface="Calibri" panose="020F0502020204030204" pitchFamily="34" charset="0"/>
@@ -20583,7 +21544,7 @@
                         </a:spcAft>
                       </a:pPr>
                       <a:r>
-                        <a:rPr lang="en-US" sz="1200">
+                        <a:rPr lang="en-US" sz="1200" dirty="0">
                           <a:effectLst/>
                           <a:latin typeface="Arial" panose="020B0604020202020204" pitchFamily="34" charset="0"/>
                           <a:ea typeface="Calibri" panose="020F0502020204030204" pitchFamily="34" charset="0"/>
@@ -20591,7 +21552,7 @@
                         </a:rPr>
                         <a:t>Co-60</a:t>
                       </a:r>
-                      <a:endParaRPr lang="en-US" sz="1100">
+                      <a:endParaRPr lang="en-US" sz="1100" dirty="0">
                         <a:effectLst/>
                         <a:latin typeface="Calibri" panose="020F0502020204030204" pitchFamily="34" charset="0"/>
                         <a:ea typeface="Calibri" panose="020F0502020204030204" pitchFamily="34" charset="0"/>
@@ -20810,7 +21771,7 @@
                         </a:spcAft>
                       </a:pPr>
                       <a:r>
-                        <a:rPr lang="en-US" sz="1200">
+                        <a:rPr lang="en-US" sz="1200" dirty="0">
                           <a:effectLst/>
                           <a:latin typeface="Arial" panose="020B0604020202020204" pitchFamily="34" charset="0"/>
                           <a:ea typeface="Calibri" panose="020F0502020204030204" pitchFamily="34" charset="0"/>
@@ -20818,7 +21779,7 @@
                         </a:rPr>
                         <a:t>1333</a:t>
                       </a:r>
-                      <a:endParaRPr lang="en-US" sz="1100">
+                      <a:endParaRPr lang="en-US" sz="1100" dirty="0">
                         <a:effectLst/>
                         <a:latin typeface="Calibri" panose="020F0502020204030204" pitchFamily="34" charset="0"/>
                         <a:ea typeface="Calibri" panose="020F0502020204030204" pitchFamily="34" charset="0"/>
@@ -20885,7 +21846,7 @@
                         </a:spcAft>
                       </a:pPr>
                       <a:r>
-                        <a:rPr lang="en-US" sz="1200">
+                        <a:rPr lang="en-US" sz="1200" dirty="0">
                           <a:effectLst/>
                           <a:latin typeface="Arial" panose="020B0604020202020204" pitchFamily="34" charset="0"/>
                           <a:ea typeface="Calibri" panose="020F0502020204030204" pitchFamily="34" charset="0"/>
@@ -20893,7 +21854,7 @@
                         </a:rPr>
                         <a:t>Co-60</a:t>
                       </a:r>
-                      <a:endParaRPr lang="en-US" sz="1100">
+                      <a:endParaRPr lang="en-US" sz="1100" dirty="0">
                         <a:effectLst/>
                         <a:latin typeface="Calibri" panose="020F0502020204030204" pitchFamily="34" charset="0"/>
                         <a:ea typeface="Calibri" panose="020F0502020204030204" pitchFamily="34" charset="0"/>
@@ -20960,7 +21921,7 @@
                         </a:spcAft>
                       </a:pPr>
                       <a:r>
-                        <a:rPr lang="en-US" sz="1200">
+                        <a:rPr lang="en-US" sz="1200" dirty="0">
                           <a:effectLst/>
                           <a:latin typeface="Arial" panose="020B0604020202020204" pitchFamily="34" charset="0"/>
                           <a:ea typeface="Calibri" panose="020F0502020204030204" pitchFamily="34" charset="0"/>
@@ -20968,7 +21929,7 @@
                         </a:rPr>
                         <a:t>0.05101</a:t>
                       </a:r>
-                      <a:endParaRPr lang="en-US" sz="1100">
+                      <a:endParaRPr lang="en-US" sz="1100" dirty="0">
                         <a:effectLst/>
                         <a:latin typeface="Calibri" panose="020F0502020204030204" pitchFamily="34" charset="0"/>
                         <a:ea typeface="Calibri" panose="020F0502020204030204" pitchFamily="34" charset="0"/>
@@ -21112,7 +22073,7 @@
                         </a:spcAft>
                       </a:pPr>
                       <a:r>
-                        <a:rPr lang="en-US" sz="1200">
+                        <a:rPr lang="en-US" sz="1200" dirty="0">
                           <a:effectLst/>
                           <a:latin typeface="Arial" panose="020B0604020202020204" pitchFamily="34" charset="0"/>
                           <a:ea typeface="Calibri" panose="020F0502020204030204" pitchFamily="34" charset="0"/>
@@ -21120,7 +22081,7 @@
                         </a:rPr>
                         <a:t>1836</a:t>
                       </a:r>
-                      <a:endParaRPr lang="en-US" sz="1100">
+                      <a:endParaRPr lang="en-US" sz="1100" dirty="0">
                         <a:effectLst/>
                         <a:latin typeface="Calibri" panose="020F0502020204030204" pitchFamily="34" charset="0"/>
                         <a:ea typeface="Calibri" panose="020F0502020204030204" pitchFamily="34" charset="0"/>
@@ -21187,7 +22148,7 @@
                         </a:spcAft>
                       </a:pPr>
                       <a:r>
-                        <a:rPr lang="en-US" sz="1200">
+                        <a:rPr lang="en-US" sz="1200" dirty="0">
                           <a:effectLst/>
                           <a:latin typeface="Arial" panose="020B0604020202020204" pitchFamily="34" charset="0"/>
                           <a:ea typeface="Calibri" panose="020F0502020204030204" pitchFamily="34" charset="0"/>
@@ -21195,7 +22156,7 @@
                         </a:rPr>
                         <a:t>Y-88</a:t>
                       </a:r>
-                      <a:endParaRPr lang="en-US" sz="1100">
+                      <a:endParaRPr lang="en-US" sz="1100" dirty="0">
                         <a:effectLst/>
                         <a:latin typeface="Calibri" panose="020F0502020204030204" pitchFamily="34" charset="0"/>
                         <a:ea typeface="Calibri" panose="020F0502020204030204" pitchFamily="34" charset="0"/>
@@ -21262,7 +22223,7 @@
                         </a:spcAft>
                       </a:pPr>
                       <a:r>
-                        <a:rPr lang="en-US" sz="1200">
+                        <a:rPr lang="en-US" sz="1200" dirty="0">
                           <a:effectLst/>
                           <a:latin typeface="Arial" panose="020B0604020202020204" pitchFamily="34" charset="0"/>
                           <a:ea typeface="Calibri" panose="020F0502020204030204" pitchFamily="34" charset="0"/>
@@ -21270,7 +22231,7 @@
                         </a:rPr>
                         <a:t>0.09622</a:t>
                       </a:r>
-                      <a:endParaRPr lang="en-US" sz="1100">
+                      <a:endParaRPr lang="en-US" sz="1100" dirty="0">
                         <a:effectLst/>
                         <a:latin typeface="Calibri" panose="020F0502020204030204" pitchFamily="34" charset="0"/>
                         <a:ea typeface="Calibri" panose="020F0502020204030204" pitchFamily="34" charset="0"/>

</xml_diff>